<commit_message>
Added charm-pptx_theme and modified intro pptx
</commit_message>
<xml_diff>
--- a/tutorial-01-intro.pptx
+++ b/tutorial-01-intro.pptx
@@ -217,7 +217,7 @@
           <a:p>
             <a:fld id="{775CE290-E0F5-444C-B849-A8F17CD4104C}" type="datetimeFigureOut">
               <a:rPr lang="en-US" smtClean="0"/>
-              <a:t>9/8/14</a:t>
+              <a:t>9/9/14</a:t>
             </a:fld>
             <a:endParaRPr lang="en-US"/>
           </a:p>
@@ -383,7 +383,7 @@
           <a:p>
             <a:fld id="{AD53A24C-4135-094C-957B-35852E7EDFA4}" type="datetimeFigureOut">
               <a:rPr lang="en-US" smtClean="0"/>
-              <a:t>9/8/14</a:t>
+              <a:t>9/9/14</a:t>
             </a:fld>
             <a:endParaRPr lang="en-US"/>
           </a:p>
@@ -1036,7 +1036,7 @@
           <a:p>
             <a:fld id="{B594EA25-E4F4-3746-A0BA-A11E27330E0F}" type="datetime2">
               <a:rPr lang="en-US" smtClean="0"/>
-              <a:t>Monday, September 8, 14</a:t>
+              <a:t>Tuesday, September 9, 14</a:t>
             </a:fld>
             <a:endParaRPr lang="en-US"/>
           </a:p>
@@ -1339,7 +1339,7 @@
                 <a:latin typeface="Times New Roman"/>
                 <a:cs typeface="Times New Roman"/>
               </a:rPr>
-              <a:t>September 8, 2014</a:t>
+              <a:t>September 9, 2014</a:t>
             </a:fld>
             <a:endParaRPr lang="en-US" dirty="0">
               <a:latin typeface="Times New Roman"/>
@@ -1437,8 +1437,8 @@
         </p:nvSpPr>
         <p:spPr>
           <a:xfrm>
-            <a:off x="457200" y="792080"/>
-            <a:ext cx="2139696" cy="1261872"/>
+            <a:off x="261865" y="161144"/>
+            <a:ext cx="2335031" cy="1261872"/>
           </a:xfrm>
         </p:spPr>
         <p:txBody>
@@ -1471,8 +1471,8 @@
         </p:nvSpPr>
         <p:spPr>
           <a:xfrm>
-            <a:off x="2971800" y="792080"/>
-            <a:ext cx="5715000" cy="5577840"/>
+            <a:off x="2971799" y="161144"/>
+            <a:ext cx="5905425" cy="6208776"/>
           </a:xfrm>
         </p:spPr>
         <p:txBody>
@@ -1556,8 +1556,8 @@
         </p:nvSpPr>
         <p:spPr>
           <a:xfrm>
-            <a:off x="457201" y="2130552"/>
-            <a:ext cx="2139696" cy="4243615"/>
+            <a:off x="261865" y="1625600"/>
+            <a:ext cx="2335032" cy="4748567"/>
           </a:xfrm>
         </p:spPr>
         <p:txBody>
@@ -1626,7 +1626,7 @@
           <a:p>
             <a:fld id="{EA699BF9-66CB-F244-8E74-7B1BE1C77046}" type="datetime2">
               <a:rPr lang="en-US" smtClean="0"/>
-              <a:t>Monday, September 8, 14</a:t>
+              <a:t>Tuesday, September 9, 14</a:t>
             </a:fld>
             <a:endParaRPr lang="en-US"/>
           </a:p>
@@ -1687,9 +1687,9 @@
           <p:nvPr/>
         </p:nvCxnSpPr>
         <p:spPr>
-          <a:xfrm rot="5400000">
-            <a:off x="-13116" y="3580206"/>
-            <a:ext cx="5577840" cy="1588"/>
+          <a:xfrm>
+            <a:off x="2775010" y="161144"/>
+            <a:ext cx="0" cy="6208776"/>
           </a:xfrm>
           <a:prstGeom prst="line">
             <a:avLst/>
@@ -1752,8 +1752,8 @@
         </p:nvSpPr>
         <p:spPr>
           <a:xfrm>
-            <a:off x="457200" y="792480"/>
-            <a:ext cx="2142680" cy="1264920"/>
+            <a:off x="258881" y="160020"/>
+            <a:ext cx="2338015" cy="1264920"/>
           </a:xfrm>
         </p:spPr>
         <p:txBody>
@@ -1786,8 +1786,8 @@
         </p:nvSpPr>
         <p:spPr>
           <a:xfrm>
-            <a:off x="2858610" y="838201"/>
-            <a:ext cx="5904390" cy="5500456"/>
+            <a:off x="2858609" y="160020"/>
+            <a:ext cx="6018615" cy="6178637"/>
           </a:xfrm>
           <a:solidFill>
             <a:schemeClr val="bg2"/>
@@ -1867,8 +1867,8 @@
         </p:nvSpPr>
         <p:spPr>
           <a:xfrm>
-            <a:off x="457200" y="2133600"/>
-            <a:ext cx="2139696" cy="4242816"/>
+            <a:off x="261865" y="1663700"/>
+            <a:ext cx="2335031" cy="4712716"/>
           </a:xfrm>
         </p:spPr>
         <p:txBody>
@@ -1937,7 +1937,7 @@
           <a:p>
             <a:fld id="{D300BE84-9843-8B4F-B3C8-647B06AC46C9}" type="datetime2">
               <a:rPr lang="en-US" smtClean="0"/>
-              <a:t>Monday, September 8, 14</a:t>
+              <a:t>Tuesday, September 9, 14</a:t>
             </a:fld>
             <a:endParaRPr lang="en-US"/>
           </a:p>
@@ -2108,7 +2108,7 @@
           <a:p>
             <a:fld id="{C460AE39-2092-A945-8296-F25085B9A0F1}" type="datetime2">
               <a:rPr lang="en-US" smtClean="0"/>
-              <a:t>Monday, September 8, 14</a:t>
+              <a:t>Tuesday, September 9, 14</a:t>
             </a:fld>
             <a:endParaRPr lang="en-US"/>
           </a:p>
@@ -2199,7 +2199,7 @@
         </p:nvSpPr>
         <p:spPr>
           <a:xfrm>
-            <a:off x="6629400" y="609600"/>
+            <a:off x="6819825" y="508000"/>
             <a:ext cx="2057400" cy="5867400"/>
           </a:xfrm>
         </p:spPr>
@@ -2227,8 +2227,8 @@
         </p:nvSpPr>
         <p:spPr>
           <a:xfrm>
-            <a:off x="457200" y="609600"/>
-            <a:ext cx="6019800" cy="5867400"/>
+            <a:off x="261865" y="508000"/>
+            <a:ext cx="6405635" cy="5867400"/>
           </a:xfrm>
         </p:spPr>
         <p:txBody>
@@ -2289,7 +2289,7 @@
           <a:p>
             <a:fld id="{63BC7E9D-3218-5E49-A867-E087AB2F4618}" type="datetime2">
               <a:rPr lang="en-US" smtClean="0"/>
-              <a:t>Monday, September 8, 14</a:t>
+              <a:t>Tuesday, September 9, 14</a:t>
             </a:fld>
             <a:endParaRPr lang="en-US"/>
           </a:p>
@@ -2460,7 +2460,7 @@
           <a:p>
             <a:fld id="{34621E95-60A9-FF44-9869-513D9D7A859F}" type="datetime2">
               <a:rPr lang="en-US" smtClean="0"/>
-              <a:t>Monday, September 8, 14</a:t>
+              <a:t>Tuesday, September 9, 14</a:t>
             </a:fld>
             <a:endParaRPr lang="en-US"/>
           </a:p>
@@ -2579,7 +2579,7 @@
           <a:p>
             <a:fld id="{BD5AFB16-13FE-DF4A-8CB7-09756A57B2EA}" type="datetime2">
               <a:rPr lang="en-US" smtClean="0"/>
-              <a:t>Monday, September 8, 14</a:t>
+              <a:t>Tuesday, September 9, 14</a:t>
             </a:fld>
             <a:endParaRPr lang="en-US" dirty="0"/>
           </a:p>
@@ -2645,8 +2645,8 @@
         </p:nvSpPr>
         <p:spPr>
           <a:xfrm>
-            <a:off x="457200" y="909977"/>
-            <a:ext cx="8229600" cy="1118512"/>
+            <a:off x="261865" y="909977"/>
+            <a:ext cx="8615360" cy="1118512"/>
           </a:xfrm>
         </p:spPr>
         <p:txBody>
@@ -2702,8 +2702,8 @@
         </p:nvSpPr>
         <p:spPr>
           <a:xfrm>
-            <a:off x="457200" y="2198574"/>
-            <a:ext cx="8229600" cy="1119049"/>
+            <a:off x="261865" y="2198574"/>
+            <a:ext cx="8615360" cy="1119049"/>
           </a:xfrm>
         </p:spPr>
         <p:txBody>
@@ -2759,8 +2759,8 @@
         </p:nvSpPr>
         <p:spPr>
           <a:xfrm>
-            <a:off x="457200" y="3583427"/>
-            <a:ext cx="8229600" cy="1136650"/>
+            <a:off x="261865" y="3583427"/>
+            <a:ext cx="8615360" cy="1136650"/>
           </a:xfrm>
         </p:spPr>
         <p:txBody>
@@ -2769,38 +2769,38 @@
           <a:p>
             <a:pPr lvl="0"/>
             <a:r>
-              <a:rPr lang="en-US" smtClean="0"/>
+              <a:rPr lang="en-US" dirty="0" smtClean="0"/>
               <a:t>Click to edit Master text styles</a:t>
             </a:r>
           </a:p>
           <a:p>
             <a:pPr lvl="1"/>
             <a:r>
-              <a:rPr lang="en-US" smtClean="0"/>
+              <a:rPr lang="en-US" dirty="0" smtClean="0"/>
               <a:t>Second level</a:t>
             </a:r>
           </a:p>
           <a:p>
             <a:pPr lvl="2"/>
             <a:r>
-              <a:rPr lang="en-US" smtClean="0"/>
+              <a:rPr lang="en-US" dirty="0" smtClean="0"/>
               <a:t>Third level</a:t>
             </a:r>
           </a:p>
           <a:p>
             <a:pPr lvl="3"/>
             <a:r>
-              <a:rPr lang="en-US" smtClean="0"/>
+              <a:rPr lang="en-US" dirty="0" smtClean="0"/>
               <a:t>Fourth level</a:t>
             </a:r>
           </a:p>
           <a:p>
             <a:pPr lvl="4"/>
             <a:r>
-              <a:rPr lang="en-US" smtClean="0"/>
+              <a:rPr lang="en-US" dirty="0" smtClean="0"/>
               <a:t>Fifth level</a:t>
             </a:r>
-            <a:endParaRPr lang="en-US"/>
+            <a:endParaRPr lang="en-US" dirty="0"/>
           </a:p>
         </p:txBody>
       </p:sp>
@@ -2816,8 +2816,8 @@
         </p:nvSpPr>
         <p:spPr>
           <a:xfrm>
-            <a:off x="457200" y="5043465"/>
-            <a:ext cx="8229600" cy="1136791"/>
+            <a:off x="261865" y="5043465"/>
+            <a:ext cx="8615360" cy="1136791"/>
           </a:xfrm>
         </p:spPr>
         <p:txBody>
@@ -2826,38 +2826,38 @@
           <a:p>
             <a:pPr lvl="0"/>
             <a:r>
-              <a:rPr lang="en-US" smtClean="0"/>
+              <a:rPr lang="en-US" dirty="0" smtClean="0"/>
               <a:t>Click to edit Master text styles</a:t>
             </a:r>
           </a:p>
           <a:p>
             <a:pPr lvl="1"/>
             <a:r>
-              <a:rPr lang="en-US" smtClean="0"/>
+              <a:rPr lang="en-US" dirty="0" smtClean="0"/>
               <a:t>Second level</a:t>
             </a:r>
           </a:p>
           <a:p>
             <a:pPr lvl="2"/>
             <a:r>
-              <a:rPr lang="en-US" smtClean="0"/>
+              <a:rPr lang="en-US" dirty="0" smtClean="0"/>
               <a:t>Third level</a:t>
             </a:r>
           </a:p>
           <a:p>
             <a:pPr lvl="3"/>
             <a:r>
-              <a:rPr lang="en-US" smtClean="0"/>
+              <a:rPr lang="en-US" dirty="0" smtClean="0"/>
               <a:t>Fourth level</a:t>
             </a:r>
           </a:p>
           <a:p>
             <a:pPr lvl="4"/>
             <a:r>
-              <a:rPr lang="en-US" smtClean="0"/>
+              <a:rPr lang="en-US" dirty="0" smtClean="0"/>
               <a:t>Fifth level</a:t>
             </a:r>
-            <a:endParaRPr lang="en-US"/>
+            <a:endParaRPr lang="en-US" dirty="0"/>
           </a:p>
         </p:txBody>
       </p:sp>
@@ -3066,7 +3066,7 @@
           <a:p>
             <a:fld id="{1BDEC705-8EA9-6C46-8E3B-2CAC7E2C0F7D}" type="datetime2">
               <a:rPr lang="en-US" smtClean="0"/>
-              <a:t>Monday, September 8, 14</a:t>
+              <a:t>Tuesday, September 9, 14</a:t>
             </a:fld>
             <a:endParaRPr lang="en-US"/>
           </a:p>
@@ -3215,8 +3215,8 @@
         </p:nvSpPr>
         <p:spPr>
           <a:xfrm>
-            <a:off x="457200" y="935846"/>
-            <a:ext cx="4038600" cy="5455810"/>
+            <a:off x="261866" y="935846"/>
+            <a:ext cx="4114800" cy="5455810"/>
           </a:xfrm>
         </p:spPr>
         <p:txBody>
@@ -3300,8 +3300,8 @@
         </p:nvSpPr>
         <p:spPr>
           <a:xfrm>
-            <a:off x="4648200" y="935846"/>
-            <a:ext cx="4038600" cy="5455810"/>
+            <a:off x="4737099" y="935846"/>
+            <a:ext cx="4140125" cy="5455810"/>
           </a:xfrm>
         </p:spPr>
         <p:txBody>
@@ -3397,7 +3397,7 @@
           <a:p>
             <a:fld id="{BF613BD3-C5FD-9543-B738-679BF38D8C83}" type="datetime2">
               <a:rPr lang="en-US" smtClean="0"/>
-              <a:t>Monday, September 8, 14</a:t>
+              <a:t>Tuesday, September 9, 14</a:t>
             </a:fld>
             <a:endParaRPr lang="en-US" dirty="0"/>
           </a:p>
@@ -3522,8 +3522,8 @@
         </p:nvSpPr>
         <p:spPr>
           <a:xfrm>
-            <a:off x="457200" y="1676400"/>
-            <a:ext cx="3931920" cy="639762"/>
+            <a:off x="261865" y="914400"/>
+            <a:ext cx="4114800" cy="639762"/>
           </a:xfrm>
           <a:noFill/>
           <a:ln>
@@ -3610,8 +3610,8 @@
         </p:nvSpPr>
         <p:spPr>
           <a:xfrm>
-            <a:off x="457200" y="2438400"/>
-            <a:ext cx="3931920" cy="3951288"/>
+            <a:off x="261865" y="1714500"/>
+            <a:ext cx="4114800" cy="4675188"/>
           </a:xfrm>
         </p:spPr>
         <p:txBody>
@@ -3695,8 +3695,8 @@
         </p:nvSpPr>
         <p:spPr>
           <a:xfrm>
-            <a:off x="4754880" y="1676400"/>
-            <a:ext cx="3931920" cy="639762"/>
+            <a:off x="4737100" y="914400"/>
+            <a:ext cx="4140125" cy="639762"/>
           </a:xfrm>
           <a:noFill/>
           <a:ln>
@@ -3786,8 +3786,8 @@
         </p:nvSpPr>
         <p:spPr>
           <a:xfrm>
-            <a:off x="4754880" y="2438400"/>
-            <a:ext cx="3931920" cy="3951288"/>
+            <a:off x="4737100" y="1714500"/>
+            <a:ext cx="4140125" cy="4675188"/>
           </a:xfrm>
         </p:spPr>
         <p:txBody>
@@ -3824,35 +3824,35 @@
           <a:p>
             <a:pPr lvl="0"/>
             <a:r>
-              <a:rPr lang="en-US" smtClean="0"/>
+              <a:rPr lang="en-US" dirty="0" smtClean="0"/>
               <a:t>Click to edit Master text styles</a:t>
             </a:r>
           </a:p>
           <a:p>
             <a:pPr lvl="1"/>
             <a:r>
-              <a:rPr lang="en-US" smtClean="0"/>
+              <a:rPr lang="en-US" dirty="0" smtClean="0"/>
               <a:t>Second level</a:t>
             </a:r>
           </a:p>
           <a:p>
             <a:pPr lvl="2"/>
             <a:r>
-              <a:rPr lang="en-US" smtClean="0"/>
+              <a:rPr lang="en-US" dirty="0" smtClean="0"/>
               <a:t>Third level</a:t>
             </a:r>
           </a:p>
           <a:p>
             <a:pPr lvl="3"/>
             <a:r>
-              <a:rPr lang="en-US" smtClean="0"/>
+              <a:rPr lang="en-US" dirty="0" smtClean="0"/>
               <a:t>Fourth level</a:t>
             </a:r>
           </a:p>
           <a:p>
             <a:pPr lvl="4"/>
             <a:r>
-              <a:rPr lang="en-US" smtClean="0"/>
+              <a:rPr lang="en-US" dirty="0" smtClean="0"/>
               <a:t>Fifth level</a:t>
             </a:r>
             <a:endParaRPr lang="en-US" dirty="0"/>
@@ -3876,7 +3876,7 @@
           <a:p>
             <a:fld id="{4B5E4F0C-9A9C-5448-99FD-D30288B385C9}" type="datetime2">
               <a:rPr lang="en-US" smtClean="0"/>
-              <a:t>Monday, September 8, 14</a:t>
+              <a:t>Tuesday, September 9, 14</a:t>
             </a:fld>
             <a:endParaRPr lang="en-US"/>
           </a:p>
@@ -3990,8 +3990,8 @@
         </p:nvSpPr>
         <p:spPr>
           <a:xfrm>
-            <a:off x="457200" y="935846"/>
-            <a:ext cx="4038600" cy="3140187"/>
+            <a:off x="261866" y="935846"/>
+            <a:ext cx="4114800" cy="3140187"/>
           </a:xfrm>
         </p:spPr>
         <p:txBody>
@@ -4075,8 +4075,8 @@
         </p:nvSpPr>
         <p:spPr>
           <a:xfrm>
-            <a:off x="4648200" y="935846"/>
-            <a:ext cx="4038600" cy="3140187"/>
+            <a:off x="4737100" y="935846"/>
+            <a:ext cx="4140124" cy="3140187"/>
           </a:xfrm>
         </p:spPr>
         <p:txBody>
@@ -4172,7 +4172,7 @@
           <a:p>
             <a:fld id="{30545249-FD76-6844-B252-CAB05FC2DAA8}" type="datetime2">
               <a:rPr lang="en-US" smtClean="0"/>
-              <a:t>Monday, September 8, 14</a:t>
+              <a:t>Tuesday, September 9, 14</a:t>
             </a:fld>
             <a:endParaRPr lang="en-US" dirty="0"/>
           </a:p>
@@ -4245,8 +4245,8 @@
         </p:nvSpPr>
         <p:spPr>
           <a:xfrm>
-            <a:off x="457200" y="4829213"/>
-            <a:ext cx="8229600" cy="1550950"/>
+            <a:off x="261865" y="4829213"/>
+            <a:ext cx="8615360" cy="1550950"/>
           </a:xfrm>
           <a:solidFill>
             <a:schemeClr val="tx2">
@@ -4313,8 +4313,8 @@
         </p:nvSpPr>
         <p:spPr>
           <a:xfrm>
-            <a:off x="457200" y="4238625"/>
-            <a:ext cx="8229600" cy="590550"/>
+            <a:off x="261865" y="4238625"/>
+            <a:ext cx="8615359" cy="590550"/>
           </a:xfrm>
           <a:solidFill>
             <a:schemeClr val="tx2">
@@ -4416,7 +4416,7 @@
           <a:p>
             <a:fld id="{CC859171-EEDD-0B48-A5C0-E7218AE20EA7}" type="datetime2">
               <a:rPr lang="en-US" smtClean="0"/>
-              <a:t>Monday, September 8, 14</a:t>
+              <a:t>Tuesday, September 9, 14</a:t>
             </a:fld>
             <a:endParaRPr lang="en-US"/>
           </a:p>
@@ -4512,7 +4512,7 @@
           <a:p>
             <a:fld id="{C32F9216-0342-7440-9504-BD6C1382BF27}" type="datetime2">
               <a:rPr lang="en-US" smtClean="0"/>
-              <a:t>Monday, September 8, 14</a:t>
+              <a:t>Tuesday, September 9, 14</a:t>
             </a:fld>
             <a:endParaRPr lang="en-US"/>
           </a:p>
@@ -4604,7 +4604,7 @@
         </p:nvSpPr>
         <p:spPr>
           <a:xfrm>
-            <a:off x="0" y="6506351"/>
+            <a:off x="0" y="6469775"/>
             <a:ext cx="9144000" cy="365760"/>
           </a:xfrm>
           <a:prstGeom prst="rect">
@@ -4649,18 +4649,62 @@
       </p:sp>
       <p:sp>
         <p:nvSpPr>
-          <p:cNvPr id="2" name="Title Placeholder 1"/>
-          <p:cNvSpPr>
-            <a:spLocks noGrp="1"/>
-          </p:cNvSpPr>
-          <p:nvPr>
-            <p:ph type="title"/>
+          <p:cNvPr id="5" name="Footer Placeholder 4"/>
+          <p:cNvSpPr>
+            <a:spLocks noGrp="1"/>
+          </p:cNvSpPr>
+          <p:nvPr>
+            <p:ph type="ftr" sz="quarter" idx="3"/>
           </p:nvPr>
         </p:nvSpPr>
         <p:spPr>
           <a:xfrm>
-            <a:off x="0" y="0"/>
-            <a:ext cx="9144000" cy="678666"/>
+            <a:off x="261865" y="6501045"/>
+            <a:ext cx="4114800" cy="329184"/>
+          </a:xfrm>
+          <a:prstGeom prst="rect">
+            <a:avLst/>
+          </a:prstGeom>
+          <a:solidFill>
+            <a:srgbClr val="A53926"/>
+          </a:solidFill>
+        </p:spPr>
+        <p:txBody>
+          <a:bodyPr vert="horz" lIns="91440" tIns="45720" rIns="91440" bIns="45720" rtlCol="0" anchor="ctr"/>
+          <a:lstStyle>
+            <a:lvl1pPr algn="ctr">
+              <a:defRPr sz="1200" b="1">
+                <a:solidFill>
+                  <a:srgbClr val="FFFFFF"/>
+                </a:solidFill>
+                <a:latin typeface="Times New Roman"/>
+                <a:cs typeface="Times New Roman"/>
+              </a:defRPr>
+            </a:lvl1pPr>
+          </a:lstStyle>
+          <a:p>
+            <a:r>
+              <a:rPr lang="en-US" smtClean="0"/>
+              <a:t>Sanjay Kalé and PPL (UIUC) – Parallel Migratable Objects </a:t>
+            </a:r>
+            <a:endParaRPr lang="en-US" dirty="0"/>
+          </a:p>
+        </p:txBody>
+      </p:sp>
+      <p:sp>
+        <p:nvSpPr>
+          <p:cNvPr id="2" name="Title Placeholder 1"/>
+          <p:cNvSpPr>
+            <a:spLocks noGrp="1"/>
+          </p:cNvSpPr>
+          <p:nvPr>
+            <p:ph type="title"/>
+          </p:nvPr>
+        </p:nvSpPr>
+        <p:spPr>
+          <a:xfrm>
+            <a:off x="0" y="-1"/>
+            <a:ext cx="9144000" cy="741859"/>
           </a:xfrm>
           <a:prstGeom prst="rect">
             <a:avLst/>
@@ -4698,15 +4742,15 @@
         </p:nvSpPr>
         <p:spPr>
           <a:xfrm>
-            <a:off x="457200" y="1143000"/>
-            <a:ext cx="8229600" cy="5235222"/>
+            <a:off x="261865" y="942770"/>
+            <a:ext cx="8615360" cy="5435452"/>
           </a:xfrm>
           <a:prstGeom prst="rect">
             <a:avLst/>
           </a:prstGeom>
         </p:spPr>
         <p:txBody>
-          <a:bodyPr vert="horz" lIns="91440" tIns="45720" rIns="91440" bIns="45720" rtlCol="0">
+          <a:bodyPr vert="horz" lIns="91440" tIns="45720" rIns="91440" bIns="45720" rtlCol="0" anchor="ctr">
             <a:normAutofit/>
           </a:bodyPr>
           <a:lstStyle/>
@@ -4760,8 +4804,8 @@
         </p:nvSpPr>
         <p:spPr>
           <a:xfrm>
-            <a:off x="457200" y="6506351"/>
-            <a:ext cx="2895600" cy="329184"/>
+            <a:off x="4737100" y="6501045"/>
+            <a:ext cx="2726982" cy="329184"/>
           </a:xfrm>
           <a:prstGeom prst="rect">
             <a:avLst/>
@@ -4783,7 +4827,7 @@
           <a:p>
             <a:fld id="{D36DC8F2-AD63-E841-8C23-5DC3A41041BE}" type="datetime2">
               <a:rPr lang="en-US" smtClean="0"/>
-              <a:t>Monday, September 8, 14</a:t>
+              <a:t>Tuesday, September 9, 14</a:t>
             </a:fld>
             <a:endParaRPr lang="en-US" dirty="0"/>
           </a:p>
@@ -4791,62 +4835,18 @@
       </p:sp>
       <p:sp>
         <p:nvSpPr>
-          <p:cNvPr id="5" name="Footer Placeholder 4"/>
-          <p:cNvSpPr>
-            <a:spLocks noGrp="1"/>
-          </p:cNvSpPr>
-          <p:nvPr>
-            <p:ph type="ftr" sz="quarter" idx="3"/>
+          <p:cNvPr id="6" name="Slide Number Placeholder 5"/>
+          <p:cNvSpPr>
+            <a:spLocks noGrp="1"/>
+          </p:cNvSpPr>
+          <p:nvPr>
+            <p:ph type="sldNum" sz="quarter" idx="4"/>
           </p:nvPr>
         </p:nvSpPr>
         <p:spPr>
           <a:xfrm>
-            <a:off x="3429000" y="6501045"/>
-            <a:ext cx="4114800" cy="329184"/>
-          </a:xfrm>
-          <a:prstGeom prst="rect">
-            <a:avLst/>
-          </a:prstGeom>
-          <a:solidFill>
-            <a:srgbClr val="A53926"/>
-          </a:solidFill>
-        </p:spPr>
-        <p:txBody>
-          <a:bodyPr vert="horz" lIns="91440" tIns="45720" rIns="91440" bIns="45720" rtlCol="0" anchor="ctr"/>
-          <a:lstStyle>
-            <a:lvl1pPr algn="ctr">
-              <a:defRPr sz="1200" b="1">
-                <a:solidFill>
-                  <a:srgbClr val="FFFFFF"/>
-                </a:solidFill>
-                <a:latin typeface="Times New Roman"/>
-                <a:cs typeface="Times New Roman"/>
-              </a:defRPr>
-            </a:lvl1pPr>
-          </a:lstStyle>
-          <a:p>
-            <a:r>
-              <a:rPr lang="en-US" smtClean="0"/>
-              <a:t>Sanjay Kalé and PPL (UIUC) – Parallel Migratable Objects </a:t>
-            </a:r>
-            <a:endParaRPr lang="en-US" dirty="0"/>
-          </a:p>
-        </p:txBody>
-      </p:sp>
-      <p:sp>
-        <p:nvSpPr>
-          <p:cNvPr id="6" name="Slide Number Placeholder 5"/>
-          <p:cNvSpPr>
-            <a:spLocks noGrp="1"/>
-          </p:cNvSpPr>
-          <p:nvPr>
-            <p:ph type="sldNum" sz="quarter" idx="4"/>
-          </p:nvPr>
-        </p:nvSpPr>
-        <p:spPr>
-          <a:xfrm>
-            <a:off x="7620000" y="6506351"/>
-            <a:ext cx="1066800" cy="329184"/>
+            <a:off x="7646459" y="6506351"/>
+            <a:ext cx="1230766" cy="329184"/>
           </a:xfrm>
           <a:prstGeom prst="rect">
             <a:avLst/>
@@ -5338,7 +5338,7 @@
         <p:spPr/>
         <p:txBody>
           <a:bodyPr>
-            <a:normAutofit fontScale="90000"/>
+            <a:normAutofit/>
           </a:bodyPr>
           <a:lstStyle/>
           <a:p>
@@ -6358,7 +6358,7 @@
           <a:p>
             <a:fld id="{EA95BFF1-5948-B24D-80C9-2DF4EAC42A4D}" type="datetime2">
               <a:rPr lang="en-US" smtClean="0"/>
-              <a:t>Monday, September 8, 14</a:t>
+              <a:t>Tuesday, September 9, 14</a:t>
             </a:fld>
             <a:endParaRPr lang="en-US"/>
           </a:p>
@@ -6462,7 +6462,7 @@
         <p:spPr/>
         <p:txBody>
           <a:bodyPr>
-            <a:normAutofit fontScale="90000"/>
+            <a:normAutofit/>
           </a:bodyPr>
           <a:lstStyle/>
           <a:p>
@@ -7439,7 +7439,7 @@
           <a:p>
             <a:fld id="{CC865FA7-76E5-5C42-96A4-1F7331433C84}" type="datetime2">
               <a:rPr lang="en-US" smtClean="0"/>
-              <a:t>Monday, September 8, 14</a:t>
+              <a:t>Tuesday, September 9, 14</a:t>
             </a:fld>
             <a:endParaRPr lang="en-US"/>
           </a:p>
@@ -7649,7 +7649,7 @@
           <a:p>
             <a:fld id="{6859C538-CB0C-6042-B4CC-A78E872CA49F}" type="datetime2">
               <a:rPr lang="en-US" smtClean="0"/>
-              <a:t>Monday, September 8, 14</a:t>
+              <a:t>Tuesday, September 9, 14</a:t>
             </a:fld>
             <a:endParaRPr lang="en-US"/>
           </a:p>
@@ -7878,7 +7878,7 @@
           <a:p>
             <a:fld id="{88DDB4B2-2C7B-074B-B68B-552850FF2C7D}" type="datetime2">
               <a:rPr lang="en-US" smtClean="0"/>
-              <a:t>Monday, September 8, 14</a:t>
+              <a:t>Tuesday, September 9, 14</a:t>
             </a:fld>
             <a:endParaRPr lang="en-US"/>
           </a:p>
@@ -7982,7 +7982,7 @@
         <p:spPr/>
         <p:txBody>
           <a:bodyPr>
-            <a:normAutofit fontScale="90000"/>
+            <a:normAutofit/>
           </a:bodyPr>
           <a:lstStyle/>
           <a:p>
@@ -8034,7 +8034,7 @@
           <a:p>
             <a:fld id="{CA5E7B7B-D7FD-4D4E-90EF-E4394C25BA2F}" type="datetime2">
               <a:rPr lang="en-US" smtClean="0"/>
-              <a:t>Monday, September 8, 14</a:t>
+              <a:t>Tuesday, September 9, 14</a:t>
             </a:fld>
             <a:endParaRPr lang="en-US"/>
           </a:p>
@@ -8248,7 +8248,7 @@
           <a:p>
             <a:fld id="{4B8F5AE3-D499-5C4D-BB64-5FC5F114D78E}" type="datetime2">
               <a:rPr lang="en-US" smtClean="0"/>
-              <a:t>Monday, September 8, 14</a:t>
+              <a:t>Tuesday, September 9, 14</a:t>
             </a:fld>
             <a:endParaRPr lang="en-US" dirty="0"/>
           </a:p>
@@ -8420,7 +8420,7 @@
         <p:spPr/>
         <p:txBody>
           <a:bodyPr>
-            <a:normAutofit fontScale="90000"/>
+            <a:normAutofit/>
           </a:bodyPr>
           <a:lstStyle/>
           <a:p>
@@ -8554,7 +8554,7 @@
           <a:p>
             <a:fld id="{8463968F-93A4-C84C-9FC0-6F1C4806BE33}" type="datetime2">
               <a:rPr lang="en-US" smtClean="0"/>
-              <a:t>Monday, September 8, 14</a:t>
+              <a:t>Tuesday, September 9, 14</a:t>
             </a:fld>
             <a:endParaRPr lang="en-US"/>
           </a:p>
@@ -8868,7 +8868,7 @@
         <p:spPr/>
         <p:txBody>
           <a:bodyPr>
-            <a:normAutofit fontScale="90000"/>
+            <a:normAutofit/>
           </a:bodyPr>
           <a:lstStyle/>
           <a:p>
@@ -8984,7 +8984,7 @@
           <a:p>
             <a:fld id="{99D99C1C-6727-C344-B1D9-5F6CCC13E6A8}" type="datetime2">
               <a:rPr lang="en-US" smtClean="0"/>
-              <a:t>Monday, September 8, 14</a:t>
+              <a:t>Tuesday, September 9, 14</a:t>
             </a:fld>
             <a:endParaRPr lang="en-US"/>
           </a:p>
@@ -9334,7 +9334,7 @@
           <a:p>
             <a:fld id="{7EE0B537-EEC6-A84A-9C51-603D8E7685E9}" type="datetime2">
               <a:rPr lang="en-US" smtClean="0"/>
-              <a:t>Monday, September 8, 14</a:t>
+              <a:t>Tuesday, September 9, 14</a:t>
             </a:fld>
             <a:endParaRPr lang="en-US"/>
           </a:p>
@@ -9438,7 +9438,7 @@
         <p:spPr/>
         <p:txBody>
           <a:bodyPr>
-            <a:normAutofit fontScale="90000"/>
+            <a:normAutofit/>
           </a:bodyPr>
           <a:lstStyle/>
           <a:p>
@@ -9732,7 +9732,7 @@
           <a:p>
             <a:fld id="{36D5A094-9275-C84D-84D4-E4C2DFD8E1DF}" type="datetime2">
               <a:rPr lang="en-US" smtClean="0"/>
-              <a:t>Monday, September 8, 14</a:t>
+              <a:t>Tuesday, September 9, 14</a:t>
             </a:fld>
             <a:endParaRPr lang="en-US"/>
           </a:p>
@@ -10048,7 +10048,7 @@
           <a:p>
             <a:fld id="{231C4983-29CA-804F-B0C2-861AD8815D43}" type="datetime2">
               <a:rPr lang="en-US" smtClean="0"/>
-              <a:t>Monday, September 8, 14</a:t>
+              <a:t>Tuesday, September 9, 14</a:t>
             </a:fld>
             <a:endParaRPr lang="en-US"/>
           </a:p>
@@ -10424,7 +10424,7 @@
           <a:p>
             <a:fld id="{49969878-E4FC-4B4F-8757-96654B5071D4}" type="datetime2">
               <a:rPr lang="en-US" smtClean="0"/>
-              <a:t>Monday, September 8, 14</a:t>
+              <a:t>Tuesday, September 9, 14</a:t>
             </a:fld>
             <a:endParaRPr lang="en-US" dirty="0"/>
           </a:p>
@@ -10818,7 +10818,7 @@
         <p:spPr/>
         <p:txBody>
           <a:bodyPr>
-            <a:normAutofit lnSpcReduction="10000"/>
+            <a:normAutofit/>
           </a:bodyPr>
           <a:lstStyle/>
           <a:p>
@@ -10936,7 +10936,7 @@
           <a:p>
             <a:fld id="{1B28481D-820C-BD47-8A20-F66B1E586D0A}" type="datetime2">
               <a:rPr lang="en-US" smtClean="0"/>
-              <a:t>Monday, September 8, 14</a:t>
+              <a:t>Tuesday, September 9, 14</a:t>
             </a:fld>
             <a:endParaRPr lang="en-US"/>
           </a:p>
@@ -11279,7 +11279,7 @@
           <a:p>
             <a:fld id="{6687E3A6-73AF-3C4A-BF08-3ECAB60FC972}" type="datetime2">
               <a:rPr lang="en-US" smtClean="0"/>
-              <a:t>Monday, September 8, 14</a:t>
+              <a:t>Tuesday, September 9, 14</a:t>
             </a:fld>
             <a:endParaRPr lang="en-US"/>
           </a:p>
@@ -11423,7 +11423,7 @@
           <a:p>
             <a:fld id="{16AB6445-942B-3D4F-9A75-1806446203C4}" type="datetime2">
               <a:rPr lang="en-US" smtClean="0"/>
-              <a:t>Monday, September 8, 14</a:t>
+              <a:t>Tuesday, September 9, 14</a:t>
             </a:fld>
             <a:endParaRPr lang="en-US"/>
           </a:p>
@@ -11710,7 +11710,7 @@
           <a:p>
             <a:fld id="{E2BEDE58-EB0D-8D49-81F3-C834FB63B2FF}" type="datetime2">
               <a:rPr lang="en-US" smtClean="0"/>
-              <a:t>Monday, September 8, 14</a:t>
+              <a:t>Tuesday, September 9, 14</a:t>
             </a:fld>
             <a:endParaRPr lang="en-US" dirty="0"/>
           </a:p>

</xml_diff>

<commit_message>
Create hyperlinks and fix some bullet spacing
</commit_message>
<xml_diff>
--- a/tutorial-01-intro.pptx
+++ b/tutorial-01-intro.pptx
@@ -9240,7 +9240,7 @@
         <p:spPr>
           <a:xfrm>
             <a:off x="243550" y="2750055"/>
-            <a:ext cx="8663424" cy="1384995"/>
+            <a:ext cx="8663424" cy="1061829"/>
           </a:xfrm>
           <a:prstGeom prst="rect">
             <a:avLst/>
@@ -9255,60 +9255,40 @@
             <a:pPr algn="ctr"/>
             <a:r>
               <a:rPr lang="en-US" sz="2100" dirty="0"/>
-              <a:t>Manual: http://</a:t>
-            </a:r>
-            <a:r>
-              <a:rPr lang="en-US" sz="2100" dirty="0" err="1"/>
-              <a:t>charm.cs.illinois.edu</a:t>
+              <a:t>Manual: </a:t>
+            </a:r>
+            <a:r>
+              <a:rPr lang="en-US" sz="2100" dirty="0" smtClean="0">
+                <a:hlinkClick r:id="rId2" tooltip="http://charm.cs.illinois.edu/manuals/html/charm++/manual.html"/>
+              </a:rPr>
+              <a:t>http://charm.cs.illinois.edu/manuals/html/charm++/manual.html</a:t>
+            </a:r>
+            <a:endParaRPr lang="en-US" sz="2100" dirty="0" smtClean="0"/>
+          </a:p>
+          <a:p>
+            <a:pPr algn="ctr"/>
+            <a:endParaRPr lang="en-US" sz="2100" dirty="0"/>
+          </a:p>
+          <a:p>
+            <a:pPr algn="ctr"/>
+            <a:r>
+              <a:rPr lang="en-US" sz="2100" dirty="0" smtClean="0"/>
+              <a:t>Installation</a:t>
             </a:r>
             <a:r>
               <a:rPr lang="en-US" sz="2100" dirty="0"/>
-              <a:t>/manuals/html/charm++/</a:t>
-            </a:r>
-            <a:r>
-              <a:rPr lang="en-US" sz="2100" dirty="0" err="1"/>
-              <a:t>manual.html</a:t>
+              <a:t>: </a:t>
+            </a:r>
+            <a:r>
+              <a:rPr lang="en-US" sz="2100" dirty="0">
+                <a:hlinkClick r:id="rId3"/>
+              </a:rPr>
+              <a:t>http://charm.cs.illinois.edu/manuals/html/charm++/A.html</a:t>
             </a:r>
             <a:r>
               <a:rPr lang="en-US" sz="2100" dirty="0"/>
               <a:t> </a:t>
             </a:r>
-            <a:endParaRPr lang="en-US" sz="2100" dirty="0" smtClean="0"/>
-          </a:p>
-          <a:p>
-            <a:pPr algn="ctr"/>
-            <a:endParaRPr lang="en-US" sz="2100" dirty="0"/>
-          </a:p>
-          <a:p>
-            <a:pPr algn="ctr"/>
-            <a:r>
-              <a:rPr lang="en-US" sz="2100" dirty="0" smtClean="0"/>
-              <a:t>Installation</a:t>
-            </a:r>
-            <a:r>
-              <a:rPr lang="en-US" sz="2100" dirty="0"/>
-              <a:t>: http://</a:t>
-            </a:r>
-            <a:r>
-              <a:rPr lang="en-US" sz="2100" dirty="0" err="1"/>
-              <a:t>charm.cs.illinois.edu</a:t>
-            </a:r>
-            <a:r>
-              <a:rPr lang="en-US" sz="2100" dirty="0"/>
-              <a:t>/manuals/html/charm++/</a:t>
-            </a:r>
-            <a:r>
-              <a:rPr lang="en-US" sz="2100" dirty="0" err="1"/>
-              <a:t>A.html</a:t>
-            </a:r>
-            <a:r>
-              <a:rPr lang="en-US" sz="2100" dirty="0"/>
-              <a:t> </a:t>
-            </a:r>
-          </a:p>
-          <a:p>
-            <a:pPr algn="ctr"/>
-            <a:endParaRPr lang="en-US" sz="2100" dirty="0"/>
           </a:p>
         </p:txBody>
       </p:sp>
@@ -11238,10 +11218,14 @@
             <a:endParaRPr lang="en-US" dirty="0"/>
           </a:p>
           <a:p>
-            <a:r>
-              <a:rPr lang="en-US" dirty="0"/>
+            <a:endParaRPr lang="en-US" dirty="0" smtClean="0"/>
+          </a:p>
+          <a:p>
+            <a:r>
+              <a:rPr lang="en-US" dirty="0" smtClean="0"/>
               <a:t>Library</a:t>
             </a:r>
+            <a:endParaRPr lang="en-US" dirty="0"/>
           </a:p>
           <a:p>
             <a:r>
@@ -11250,9 +11234,16 @@
             </a:r>
           </a:p>
           <a:p>
+            <a:endParaRPr lang="en-US" dirty="0" smtClean="0"/>
+          </a:p>
+          <a:p>
+            <a:r>
+              <a:rPr lang="en-US" dirty="0" smtClean="0"/>
+              <a:t>MPI </a:t>
+            </a:r>
             <a:r>
               <a:rPr lang="en-US" dirty="0"/>
-              <a:t>MPI does not directly support automated resource management (e.g. load balancing, fault tolerance, etc.)</a:t>
+              <a:t>does not directly support automated resource management (e.g. load balancing, fault tolerance, etc.)</a:t>
             </a:r>
           </a:p>
         </p:txBody>

</xml_diff>

<commit_message>
modified charm-pptx_theme and applied to tutorial-01
</commit_message>
<xml_diff>
--- a/tutorial-01-intro.pptx
+++ b/tutorial-01-intro.pptx
@@ -223,7 +223,7 @@
           <a:p>
             <a:fld id="{775CE290-E0F5-444C-B849-A8F17CD4104C}" type="datetimeFigureOut">
               <a:rPr lang="en-US" smtClean="0"/>
-              <a:t>9/10/14</a:t>
+              <a:t>9/12/14</a:t>
             </a:fld>
             <a:endParaRPr lang="en-US"/>
           </a:p>
@@ -389,7 +389,7 @@
           <a:p>
             <a:fld id="{AD53A24C-4135-094C-957B-35852E7EDFA4}" type="datetimeFigureOut">
               <a:rPr lang="en-US" smtClean="0"/>
-              <a:t>9/10/14</a:t>
+              <a:t>9/12/14</a:t>
             </a:fld>
             <a:endParaRPr lang="en-US"/>
           </a:p>
@@ -1424,9 +1424,9 @@
           <a:bodyPr/>
           <a:lstStyle/>
           <a:p>
-            <a:fld id="{B594EA25-E4F4-3746-A0BA-A11E27330E0F}" type="datetime2">
+            <a:fld id="{9EE71821-C25D-C84D-BC06-3A5B9B475A51}" type="datetime2">
               <a:rPr lang="en-US" smtClean="0"/>
-              <a:t>Wednesday, September 10, 14</a:t>
+              <a:t>Friday, September 12, 14</a:t>
             </a:fld>
             <a:endParaRPr lang="en-US"/>
           </a:p>
@@ -1450,7 +1450,7 @@
             <a:pPr algn="r"/>
             <a:r>
               <a:rPr lang="en-US" smtClean="0"/>
-              <a:t>Sanjay Kalé and PPL (UIUC) – Parallel Migratable Objects </a:t>
+              <a:t>Laxmikant Kalé and PPL (UIUC) – Parallel Migratable Objects </a:t>
             </a:r>
             <a:endParaRPr lang="en-US" dirty="0"/>
           </a:p>
@@ -1729,7 +1729,7 @@
                 <a:latin typeface="Times New Roman"/>
                 <a:cs typeface="Times New Roman"/>
               </a:rPr>
-              <a:t>September 10, 2014</a:t>
+              <a:t>September 12, 2014</a:t>
             </a:fld>
             <a:endParaRPr lang="en-US" dirty="0">
               <a:latin typeface="Times New Roman"/>
@@ -2003,7 +2003,7 @@
                 <a:latin typeface="Times New Roman"/>
                 <a:cs typeface="Times New Roman"/>
               </a:rPr>
-              <a:t>September 10, 2014</a:t>
+              <a:t>September 12, 2014</a:t>
             </a:fld>
             <a:endParaRPr lang="en-US" dirty="0">
               <a:latin typeface="Times New Roman"/>
@@ -2236,9 +2236,9 @@
           <a:bodyPr/>
           <a:lstStyle/>
           <a:p>
-            <a:fld id="{EA699BF9-66CB-F244-8E74-7B1BE1C77046}" type="datetime2">
+            <a:fld id="{F7E18B9C-4BF5-8240-B6AB-ADE712045BD6}" type="datetime2">
               <a:rPr lang="en-US" smtClean="0"/>
-              <a:t>Wednesday, September 10, 14</a:t>
+              <a:t>Friday, September 12, 14</a:t>
             </a:fld>
             <a:endParaRPr lang="en-US"/>
           </a:p>
@@ -2262,7 +2262,7 @@
             <a:pPr algn="r"/>
             <a:r>
               <a:rPr lang="en-US" smtClean="0"/>
-              <a:t>Sanjay Kalé and PPL (UIUC) – Parallel Migratable Objects </a:t>
+              <a:t>Laxmikant Kalé and PPL (UIUC) – Parallel Migratable Objects </a:t>
             </a:r>
             <a:endParaRPr lang="en-US" dirty="0"/>
           </a:p>
@@ -2547,9 +2547,9 @@
           <a:bodyPr/>
           <a:lstStyle/>
           <a:p>
-            <a:fld id="{D300BE84-9843-8B4F-B3C8-647B06AC46C9}" type="datetime2">
+            <a:fld id="{A40840C6-9FEC-0245-8DBB-094AA7D22CCF}" type="datetime2">
               <a:rPr lang="en-US" smtClean="0"/>
-              <a:t>Wednesday, September 10, 14</a:t>
+              <a:t>Friday, September 12, 14</a:t>
             </a:fld>
             <a:endParaRPr lang="en-US"/>
           </a:p>
@@ -2573,7 +2573,7 @@
             <a:pPr algn="r"/>
             <a:r>
               <a:rPr lang="en-US" smtClean="0"/>
-              <a:t>Sanjay Kalé and PPL (UIUC) – Parallel Migratable Objects </a:t>
+              <a:t>Laxmikant Kalé and PPL (UIUC) – Parallel Migratable Objects </a:t>
             </a:r>
             <a:endParaRPr lang="en-US" dirty="0"/>
           </a:p>
@@ -2718,9 +2718,9 @@
           <a:bodyPr/>
           <a:lstStyle/>
           <a:p>
-            <a:fld id="{C460AE39-2092-A945-8296-F25085B9A0F1}" type="datetime2">
+            <a:fld id="{85E5FCBD-9AB3-2749-989C-ECE844367113}" type="datetime2">
               <a:rPr lang="en-US" smtClean="0"/>
-              <a:t>Wednesday, September 10, 14</a:t>
+              <a:t>Friday, September 12, 14</a:t>
             </a:fld>
             <a:endParaRPr lang="en-US"/>
           </a:p>
@@ -2744,7 +2744,7 @@
             <a:pPr algn="r"/>
             <a:r>
               <a:rPr lang="en-US" smtClean="0"/>
-              <a:t>Sanjay Kalé and PPL (UIUC) – Parallel Migratable Objects </a:t>
+              <a:t>Laxmikant Kalé and PPL (UIUC) – Parallel Migratable Objects </a:t>
             </a:r>
             <a:endParaRPr lang="en-US" dirty="0"/>
           </a:p>
@@ -2899,9 +2899,9 @@
           <a:bodyPr/>
           <a:lstStyle/>
           <a:p>
-            <a:fld id="{63BC7E9D-3218-5E49-A867-E087AB2F4618}" type="datetime2">
+            <a:fld id="{2CE68F07-7347-BA4F-9684-8FA226AC9994}" type="datetime2">
               <a:rPr lang="en-US" smtClean="0"/>
-              <a:t>Wednesday, September 10, 14</a:t>
+              <a:t>Friday, September 12, 14</a:t>
             </a:fld>
             <a:endParaRPr lang="en-US"/>
           </a:p>
@@ -2925,7 +2925,7 @@
             <a:pPr algn="r"/>
             <a:r>
               <a:rPr lang="en-US" smtClean="0"/>
-              <a:t>Sanjay Kalé and PPL (UIUC) – Parallel Migratable Objects </a:t>
+              <a:t>Laxmikant Kalé and PPL (UIUC) – Parallel Migratable Objects </a:t>
             </a:r>
             <a:endParaRPr lang="en-US" dirty="0"/>
           </a:p>
@@ -3153,9 +3153,9 @@
           <a:bodyPr/>
           <a:lstStyle/>
           <a:p>
-            <a:fld id="{B594EA25-E4F4-3746-A0BA-A11E27330E0F}" type="datetime2">
+            <a:fld id="{DD89BE09-B630-CC4F-BE98-124A2EE8B130}" type="datetime2">
               <a:rPr lang="en-US" smtClean="0"/>
-              <a:t>Wednesday, September 10, 14</a:t>
+              <a:t>Friday, September 12, 14</a:t>
             </a:fld>
             <a:endParaRPr lang="en-US"/>
           </a:p>
@@ -3179,7 +3179,7 @@
             <a:pPr algn="r"/>
             <a:r>
               <a:rPr lang="en-US" smtClean="0"/>
-              <a:t>Sanjay Kalé and PPL (UIUC) – Parallel Migratable Objects </a:t>
+              <a:t>Laxmikant Kalé and PPL (UIUC) – Parallel Migratable Objects </a:t>
             </a:r>
             <a:endParaRPr lang="en-US" dirty="0"/>
           </a:p>
@@ -3458,7 +3458,7 @@
                 <a:latin typeface="Times New Roman"/>
                 <a:cs typeface="Times New Roman"/>
               </a:rPr>
-              <a:t>September 10, 2014</a:t>
+              <a:t>September 12, 2014</a:t>
             </a:fld>
             <a:endParaRPr lang="en-US" dirty="0">
               <a:latin typeface="Times New Roman"/>
@@ -3582,9 +3582,9 @@
           <a:bodyPr/>
           <a:lstStyle/>
           <a:p>
-            <a:fld id="{BD5AFB16-13FE-DF4A-8CB7-09756A57B2EA}" type="datetime2">
+            <a:fld id="{519816A8-A8BC-EC45-B0FE-D44F789D99D9}" type="datetime2">
               <a:rPr lang="en-US" smtClean="0"/>
-              <a:t>Wednesday, September 10, 14</a:t>
+              <a:t>Friday, September 12, 14</a:t>
             </a:fld>
             <a:endParaRPr lang="en-US" dirty="0"/>
           </a:p>
@@ -3608,7 +3608,7 @@
             <a:pPr algn="r"/>
             <a:r>
               <a:rPr lang="en-US" smtClean="0"/>
-              <a:t>Sanjay Kalé and PPL (UIUC) – Parallel Migratable Objects </a:t>
+              <a:t>Laxmikant Kalé and PPL (UIUC) – Parallel Migratable Objects </a:t>
             </a:r>
             <a:endParaRPr lang="en-US" dirty="0"/>
           </a:p>
@@ -4111,9 +4111,9 @@
             </a:lvl1pPr>
           </a:lstStyle>
           <a:p>
-            <a:fld id="{30545249-FD76-6844-B252-CAB05FC2DAA8}" type="datetime2">
+            <a:fld id="{BE0E9CCC-0E7B-6041-9897-6EF413B16B3E}" type="datetime2">
               <a:rPr lang="en-US" smtClean="0"/>
-              <a:t>Wednesday, September 10, 14</a:t>
+              <a:t>Friday, September 12, 14</a:t>
             </a:fld>
             <a:endParaRPr lang="en-US" dirty="0"/>
           </a:p>
@@ -4144,7 +4144,7 @@
             <a:pPr algn="r"/>
             <a:r>
               <a:rPr lang="en-US" smtClean="0"/>
-              <a:t>Sanjay Kalé and PPL (UIUC) – Parallel Migratable Objects </a:t>
+              <a:t>Laxmikant Kalé and PPL (UIUC) – Parallel Migratable Objects </a:t>
             </a:r>
             <a:endParaRPr lang="en-US" dirty="0"/>
           </a:p>
@@ -4407,9 +4407,9 @@
           <a:bodyPr/>
           <a:lstStyle/>
           <a:p>
-            <a:fld id="{34621E95-60A9-FF44-9869-513D9D7A859F}" type="datetime2">
+            <a:fld id="{3B74148E-8ADD-2B47-8BB3-ABD320C934E7}" type="datetime2">
               <a:rPr lang="en-US" smtClean="0"/>
-              <a:t>Wednesday, September 10, 14</a:t>
+              <a:t>Friday, September 12, 14</a:t>
             </a:fld>
             <a:endParaRPr lang="en-US"/>
           </a:p>
@@ -4433,7 +4433,7 @@
             <a:pPr algn="r"/>
             <a:r>
               <a:rPr lang="en-US" smtClean="0"/>
-              <a:t>Sanjay Kalé and PPL (UIUC) – Parallel Migratable Objects </a:t>
+              <a:t>Laxmikant Kalé and PPL (UIUC) – Parallel Migratable Objects </a:t>
             </a:r>
             <a:endParaRPr lang="en-US" dirty="0"/>
           </a:p>
@@ -4526,9 +4526,9 @@
           <a:bodyPr/>
           <a:lstStyle/>
           <a:p>
-            <a:fld id="{BD5AFB16-13FE-DF4A-8CB7-09756A57B2EA}" type="datetime2">
+            <a:fld id="{7F02E6E9-9119-064C-81C4-1DA6DFE765FF}" type="datetime2">
               <a:rPr lang="en-US" smtClean="0"/>
-              <a:t>Wednesday, September 10, 14</a:t>
+              <a:t>Friday, September 12, 14</a:t>
             </a:fld>
             <a:endParaRPr lang="en-US" dirty="0"/>
           </a:p>
@@ -4552,7 +4552,7 @@
             <a:pPr algn="r"/>
             <a:r>
               <a:rPr lang="en-US" smtClean="0"/>
-              <a:t>Sanjay Kalé and PPL (UIUC) – Parallel Migratable Objects </a:t>
+              <a:t>Laxmikant Kalé and PPL (UIUC) – Parallel Migratable Objects </a:t>
             </a:r>
             <a:endParaRPr lang="en-US" dirty="0"/>
           </a:p>
@@ -5013,9 +5013,9 @@
           <a:bodyPr/>
           <a:lstStyle/>
           <a:p>
-            <a:fld id="{1BDEC705-8EA9-6C46-8E3B-2CAC7E2C0F7D}" type="datetime2">
+            <a:fld id="{5DA60957-BFCC-C345-B650-62BA95CE1170}" type="datetime2">
               <a:rPr lang="en-US" smtClean="0"/>
-              <a:t>Wednesday, September 10, 14</a:t>
+              <a:t>Friday, September 12, 14</a:t>
             </a:fld>
             <a:endParaRPr lang="en-US"/>
           </a:p>
@@ -5039,7 +5039,7 @@
             <a:pPr algn="r"/>
             <a:r>
               <a:rPr lang="en-US" smtClean="0"/>
-              <a:t>Sanjay Kalé and PPL (UIUC) – Parallel Migratable Objects </a:t>
+              <a:t>Laxmikant Kalé and PPL (UIUC) – Parallel Migratable Objects </a:t>
             </a:r>
             <a:endParaRPr lang="en-US" dirty="0"/>
           </a:p>
@@ -5344,9 +5344,9 @@
             </a:lvl1pPr>
           </a:lstStyle>
           <a:p>
-            <a:fld id="{BF613BD3-C5FD-9543-B738-679BF38D8C83}" type="datetime2">
+            <a:fld id="{23E5D42B-E71F-D446-A410-472B6B2370C2}" type="datetime2">
               <a:rPr lang="en-US" smtClean="0"/>
-              <a:t>Wednesday, September 10, 14</a:t>
+              <a:t>Friday, September 12, 14</a:t>
             </a:fld>
             <a:endParaRPr lang="en-US" dirty="0"/>
           </a:p>
@@ -5377,7 +5377,7 @@
             <a:pPr algn="r"/>
             <a:r>
               <a:rPr lang="en-US" smtClean="0"/>
-              <a:t>Sanjay Kalé and PPL (UIUC) – Parallel Migratable Objects </a:t>
+              <a:t>Laxmikant Kalé and PPL (UIUC) – Parallel Migratable Objects </a:t>
             </a:r>
             <a:endParaRPr lang="en-US" dirty="0"/>
           </a:p>
@@ -5823,9 +5823,9 @@
           <a:bodyPr/>
           <a:lstStyle/>
           <a:p>
-            <a:fld id="{4B5E4F0C-9A9C-5448-99FD-D30288B385C9}" type="datetime2">
+            <a:fld id="{CE5BA7E4-AA51-174E-BDA7-EBCC519D3B2D}" type="datetime2">
               <a:rPr lang="en-US" smtClean="0"/>
-              <a:t>Wednesday, September 10, 14</a:t>
+              <a:t>Friday, September 12, 14</a:t>
             </a:fld>
             <a:endParaRPr lang="en-US"/>
           </a:p>
@@ -5849,7 +5849,7 @@
             <a:pPr algn="r"/>
             <a:r>
               <a:rPr lang="en-US" smtClean="0"/>
-              <a:t>Sanjay Kalé and PPL (UIUC) – Parallel Migratable Objects </a:t>
+              <a:t>Laxmikant Kalé and PPL (UIUC) – Parallel Migratable Objects </a:t>
             </a:r>
             <a:endParaRPr lang="en-US" dirty="0"/>
           </a:p>
@@ -6119,9 +6119,9 @@
             </a:lvl1pPr>
           </a:lstStyle>
           <a:p>
-            <a:fld id="{30545249-FD76-6844-B252-CAB05FC2DAA8}" type="datetime2">
+            <a:fld id="{1DEB5EF7-9EA4-4744-9A6D-B361EDD9A13B}" type="datetime2">
               <a:rPr lang="en-US" smtClean="0"/>
-              <a:t>Wednesday, September 10, 14</a:t>
+              <a:t>Friday, September 12, 14</a:t>
             </a:fld>
             <a:endParaRPr lang="en-US" dirty="0"/>
           </a:p>
@@ -6152,7 +6152,7 @@
             <a:pPr algn="r"/>
             <a:r>
               <a:rPr lang="en-US" smtClean="0"/>
-              <a:t>Sanjay Kalé and PPL (UIUC) – Parallel Migratable Objects </a:t>
+              <a:t>Laxmikant Kalé and PPL (UIUC) – Parallel Migratable Objects </a:t>
             </a:r>
             <a:endParaRPr lang="en-US" dirty="0"/>
           </a:p>
@@ -6362,9 +6362,9 @@
           <a:bodyPr/>
           <a:lstStyle/>
           <a:p>
-            <a:fld id="{CC859171-EEDD-0B48-A5C0-E7218AE20EA7}" type="datetime2">
+            <a:fld id="{148AEB91-14AB-0540-AB84-4182AA872FD7}" type="datetime2">
               <a:rPr lang="en-US" smtClean="0"/>
-              <a:t>Wednesday, September 10, 14</a:t>
+              <a:t>Friday, September 12, 14</a:t>
             </a:fld>
             <a:endParaRPr lang="en-US"/>
           </a:p>
@@ -6388,7 +6388,7 @@
             <a:pPr algn="r"/>
             <a:r>
               <a:rPr lang="en-US" smtClean="0"/>
-              <a:t>Sanjay Kalé and PPL (UIUC) – Parallel Migratable Objects </a:t>
+              <a:t>Laxmikant Kalé and PPL (UIUC) – Parallel Migratable Objects </a:t>
             </a:r>
             <a:endParaRPr lang="en-US" dirty="0"/>
           </a:p>
@@ -6458,9 +6458,9 @@
           <a:bodyPr/>
           <a:lstStyle/>
           <a:p>
-            <a:fld id="{C32F9216-0342-7440-9504-BD6C1382BF27}" type="datetime2">
+            <a:fld id="{00E77434-9BF3-F04F-9C42-D83C903AE7BE}" type="datetime2">
               <a:rPr lang="en-US" smtClean="0"/>
-              <a:t>Wednesday, September 10, 14</a:t>
+              <a:t>Friday, September 12, 14</a:t>
             </a:fld>
             <a:endParaRPr lang="en-US"/>
           </a:p>
@@ -6484,7 +6484,7 @@
             <a:pPr algn="r"/>
             <a:r>
               <a:rPr lang="en-US" smtClean="0"/>
-              <a:t>Sanjay Kalé and PPL (UIUC) – Parallel Migratable Objects </a:t>
+              <a:t>Laxmikant Kalé and PPL (UIUC) – Parallel Migratable Objects </a:t>
             </a:r>
             <a:endParaRPr lang="en-US" dirty="0"/>
           </a:p>
@@ -6632,8 +6632,12 @@
           </a:lstStyle>
           <a:p>
             <a:r>
-              <a:rPr lang="en-US" smtClean="0"/>
-              <a:t>Sanjay Kalé and PPL (UIUC) – Parallel Migratable Objects </a:t>
+              <a:rPr lang="en-US" dirty="0" smtClean="0"/>
+              <a:t>Laxmikant Kalé </a:t>
+            </a:r>
+            <a:r>
+              <a:rPr lang="en-US" dirty="0" smtClean="0"/>
+              <a:t>and PPL (UIUC) – Parallel Migratable Objects </a:t>
             </a:r>
             <a:endParaRPr lang="en-US" dirty="0"/>
           </a:p>
@@ -6705,35 +6709,35 @@
           <a:p>
             <a:pPr lvl="0"/>
             <a:r>
-              <a:rPr lang="en-US" smtClean="0"/>
+              <a:rPr lang="en-US" dirty="0" smtClean="0"/>
               <a:t>Click to edit Master text styles</a:t>
             </a:r>
           </a:p>
           <a:p>
             <a:pPr lvl="1"/>
             <a:r>
-              <a:rPr lang="en-US" smtClean="0"/>
+              <a:rPr lang="en-US" dirty="0" smtClean="0"/>
               <a:t>Second level</a:t>
             </a:r>
           </a:p>
           <a:p>
             <a:pPr lvl="2"/>
             <a:r>
-              <a:rPr lang="en-US" smtClean="0"/>
+              <a:rPr lang="en-US" dirty="0" smtClean="0"/>
               <a:t>Third level</a:t>
             </a:r>
           </a:p>
           <a:p>
             <a:pPr lvl="3"/>
             <a:r>
-              <a:rPr lang="en-US" smtClean="0"/>
+              <a:rPr lang="en-US" dirty="0" smtClean="0"/>
               <a:t>Fourth level</a:t>
             </a:r>
           </a:p>
           <a:p>
             <a:pPr lvl="4"/>
             <a:r>
-              <a:rPr lang="en-US" smtClean="0"/>
+              <a:rPr lang="en-US" dirty="0" smtClean="0"/>
               <a:t>Fifth level</a:t>
             </a:r>
             <a:endParaRPr lang="en-US" dirty="0"/>
@@ -6773,9 +6777,9 @@
             </a:lvl1pPr>
           </a:lstStyle>
           <a:p>
-            <a:fld id="{D36DC8F2-AD63-E841-8C23-5DC3A41041BE}" type="datetime2">
+            <a:fld id="{FB880D32-D019-364E-9C36-C9180074EACA}" type="datetime2">
               <a:rPr lang="en-US" smtClean="0"/>
-              <a:t>Wednesday, September 10, 14</a:t>
+              <a:t>Friday, September 12, 14</a:t>
             </a:fld>
             <a:endParaRPr lang="en-US" dirty="0"/>
           </a:p>
@@ -6844,7 +6848,7 @@
     <p:sldLayoutId id="2147483973" r:id="rId15"/>
     <p:sldLayoutId id="2147483972" r:id="rId16"/>
   </p:sldLayoutIdLst>
-  <p:hf hdr="0"/>
+  <p:hf hdr="0" dt="0"/>
   <p:txStyles>
     <p:titleStyle>
       <a:lvl1pPr algn="l" defTabSz="914400" rtl="0" eaLnBrk="1" latinLnBrk="0" hangingPunct="1">
@@ -7381,29 +7385,6 @@
       </p:sp>
       <p:sp>
         <p:nvSpPr>
-          <p:cNvPr id="4" name="Date Placeholder 3"/>
-          <p:cNvSpPr>
-            <a:spLocks noGrp="1"/>
-          </p:cNvSpPr>
-          <p:nvPr>
-            <p:ph type="dt" sz="half" idx="10"/>
-          </p:nvPr>
-        </p:nvSpPr>
-        <p:spPr/>
-        <p:txBody>
-          <a:bodyPr/>
-          <a:lstStyle/>
-          <a:p>
-            <a:fld id="{EA95BFF1-5948-B24D-80C9-2DF4EAC42A4D}" type="datetime2">
-              <a:rPr lang="en-US" smtClean="0"/>
-              <a:t>Wednesday, September 10, 14</a:t>
-            </a:fld>
-            <a:endParaRPr lang="en-US"/>
-          </a:p>
-        </p:txBody>
-      </p:sp>
-      <p:sp>
-        <p:nvSpPr>
           <p:cNvPr id="5" name="Footer Placeholder 4"/>
           <p:cNvSpPr>
             <a:spLocks noGrp="1"/>
@@ -7420,7 +7401,7 @@
             <a:pPr algn="r"/>
             <a:r>
               <a:rPr lang="en-US" smtClean="0"/>
-              <a:t>Sanjay Kalé and PPL (UIUC) – Parallel Migratable Objects </a:t>
+              <a:t>Laxmikant Kalé and PPL (UIUC) – Parallel Migratable Objects </a:t>
             </a:r>
             <a:endParaRPr lang="en-US" dirty="0"/>
           </a:p>
@@ -8501,29 +8482,6 @@
       </p:sp>
       <p:sp>
         <p:nvSpPr>
-          <p:cNvPr id="4" name="Date Placeholder 3"/>
-          <p:cNvSpPr>
-            <a:spLocks noGrp="1"/>
-          </p:cNvSpPr>
-          <p:nvPr>
-            <p:ph type="dt" sz="half" idx="10"/>
-          </p:nvPr>
-        </p:nvSpPr>
-        <p:spPr/>
-        <p:txBody>
-          <a:bodyPr/>
-          <a:lstStyle/>
-          <a:p>
-            <a:fld id="{CC865FA7-76E5-5C42-96A4-1F7331433C84}" type="datetime2">
-              <a:rPr lang="en-US" smtClean="0"/>
-              <a:t>Wednesday, September 10, 14</a:t>
-            </a:fld>
-            <a:endParaRPr lang="en-US"/>
-          </a:p>
-        </p:txBody>
-      </p:sp>
-      <p:sp>
-        <p:nvSpPr>
           <p:cNvPr id="15" name="Footer Placeholder 14"/>
           <p:cNvSpPr>
             <a:spLocks noGrp="1"/>
@@ -8540,7 +8498,7 @@
             <a:pPr algn="r"/>
             <a:r>
               <a:rPr lang="en-US" smtClean="0"/>
-              <a:t>Sanjay Kalé and PPL (UIUC) – Parallel Migratable Objects </a:t>
+              <a:t>Laxmikant Kalé and PPL (UIUC) – Parallel Migratable Objects </a:t>
             </a:r>
             <a:endParaRPr lang="en-US" dirty="0"/>
           </a:p>
@@ -9561,29 +9519,6 @@
       </p:sp>
       <p:sp>
         <p:nvSpPr>
-          <p:cNvPr id="4" name="Date Placeholder 3"/>
-          <p:cNvSpPr>
-            <a:spLocks noGrp="1"/>
-          </p:cNvSpPr>
-          <p:nvPr>
-            <p:ph type="dt" sz="half" idx="10"/>
-          </p:nvPr>
-        </p:nvSpPr>
-        <p:spPr/>
-        <p:txBody>
-          <a:bodyPr/>
-          <a:lstStyle/>
-          <a:p>
-            <a:fld id="{6859C538-CB0C-6042-B4CC-A78E872CA49F}" type="datetime2">
-              <a:rPr lang="en-US" smtClean="0"/>
-              <a:t>Wednesday, September 10, 14</a:t>
-            </a:fld>
-            <a:endParaRPr lang="en-US"/>
-          </a:p>
-        </p:txBody>
-      </p:sp>
-      <p:sp>
-        <p:nvSpPr>
           <p:cNvPr id="6" name="Footer Placeholder 5"/>
           <p:cNvSpPr>
             <a:spLocks noGrp="1"/>
@@ -9600,7 +9535,7 @@
             <a:pPr algn="r"/>
             <a:r>
               <a:rPr lang="en-US" smtClean="0"/>
-              <a:t>Sanjay Kalé and PPL (UIUC) – Parallel Migratable Objects </a:t>
+              <a:t>Laxmikant Kalé and PPL (UIUC) – Parallel Migratable Objects </a:t>
             </a:r>
             <a:endParaRPr lang="en-US" dirty="0"/>
           </a:p>
@@ -9790,29 +9725,6 @@
       </p:sp>
       <p:sp>
         <p:nvSpPr>
-          <p:cNvPr id="5" name="Date Placeholder 4"/>
-          <p:cNvSpPr>
-            <a:spLocks noGrp="1"/>
-          </p:cNvSpPr>
-          <p:nvPr>
-            <p:ph type="dt" sz="half" idx="10"/>
-          </p:nvPr>
-        </p:nvSpPr>
-        <p:spPr/>
-        <p:txBody>
-          <a:bodyPr/>
-          <a:lstStyle/>
-          <a:p>
-            <a:fld id="{88DDB4B2-2C7B-074B-B68B-552850FF2C7D}" type="datetime2">
-              <a:rPr lang="en-US" smtClean="0"/>
-              <a:t>Wednesday, September 10, 14</a:t>
-            </a:fld>
-            <a:endParaRPr lang="en-US"/>
-          </a:p>
-        </p:txBody>
-      </p:sp>
-      <p:sp>
-        <p:nvSpPr>
           <p:cNvPr id="6" name="Footer Placeholder 5"/>
           <p:cNvSpPr>
             <a:spLocks noGrp="1"/>
@@ -9829,7 +9741,7 @@
             <a:pPr algn="r"/>
             <a:r>
               <a:rPr lang="en-US" smtClean="0"/>
-              <a:t>Sanjay Kalé and PPL (UIUC) – Parallel Migratable Objects </a:t>
+              <a:t>Laxmikant Kalé and PPL (UIUC) – Parallel Migratable Objects </a:t>
             </a:r>
             <a:endParaRPr lang="en-US" dirty="0"/>
           </a:p>
@@ -9946,29 +9858,6 @@
       </p:sp>
       <p:sp>
         <p:nvSpPr>
-          <p:cNvPr id="4" name="Date Placeholder 3"/>
-          <p:cNvSpPr>
-            <a:spLocks noGrp="1"/>
-          </p:cNvSpPr>
-          <p:nvPr>
-            <p:ph type="dt" sz="half" idx="10"/>
-          </p:nvPr>
-        </p:nvSpPr>
-        <p:spPr/>
-        <p:txBody>
-          <a:bodyPr/>
-          <a:lstStyle/>
-          <a:p>
-            <a:fld id="{CA5E7B7B-D7FD-4D4E-90EF-E4394C25BA2F}" type="datetime2">
-              <a:rPr lang="en-US" smtClean="0"/>
-              <a:t>Wednesday, September 10, 14</a:t>
-            </a:fld>
-            <a:endParaRPr lang="en-US"/>
-          </a:p>
-        </p:txBody>
-      </p:sp>
-      <p:sp>
-        <p:nvSpPr>
           <p:cNvPr id="5" name="Footer Placeholder 4"/>
           <p:cNvSpPr>
             <a:spLocks noGrp="1"/>
@@ -9985,7 +9874,7 @@
             <a:pPr algn="r"/>
             <a:r>
               <a:rPr lang="en-US" smtClean="0"/>
-              <a:t>Sanjay Kalé and PPL (UIUC) – Parallel Migratable Objects </a:t>
+              <a:t>Laxmikant Kalé and PPL (UIUC) – Parallel Migratable Objects </a:t>
             </a:r>
             <a:endParaRPr lang="en-US" dirty="0"/>
           </a:p>
@@ -10179,29 +10068,6 @@
       </p:pic>
       <p:sp>
         <p:nvSpPr>
-          <p:cNvPr id="4" name="Date Placeholder 3"/>
-          <p:cNvSpPr>
-            <a:spLocks noGrp="1"/>
-          </p:cNvSpPr>
-          <p:nvPr>
-            <p:ph type="dt" sz="half" idx="10"/>
-          </p:nvPr>
-        </p:nvSpPr>
-        <p:spPr/>
-        <p:txBody>
-          <a:bodyPr/>
-          <a:lstStyle/>
-          <a:p>
-            <a:fld id="{4B8F5AE3-D499-5C4D-BB64-5FC5F114D78E}" type="datetime2">
-              <a:rPr lang="en-US" smtClean="0"/>
-              <a:t>Wednesday, September 10, 14</a:t>
-            </a:fld>
-            <a:endParaRPr lang="en-US" dirty="0"/>
-          </a:p>
-        </p:txBody>
-      </p:sp>
-      <p:sp>
-        <p:nvSpPr>
           <p:cNvPr id="6" name="Footer Placeholder 5"/>
           <p:cNvSpPr>
             <a:spLocks noGrp="1"/>
@@ -10218,7 +10084,7 @@
             <a:pPr algn="r"/>
             <a:r>
               <a:rPr lang="en-US" smtClean="0"/>
-              <a:t>Sanjay Kalé and PPL (UIUC) – Parallel Migratable Objects </a:t>
+              <a:t>Laxmikant Kalé and PPL (UIUC) – Parallel Migratable Objects </a:t>
             </a:r>
             <a:endParaRPr lang="en-US" dirty="0"/>
           </a:p>
@@ -10436,29 +10302,6 @@
       </p:sp>
       <p:sp>
         <p:nvSpPr>
-          <p:cNvPr id="4" name="Date Placeholder 3"/>
-          <p:cNvSpPr>
-            <a:spLocks noGrp="1"/>
-          </p:cNvSpPr>
-          <p:nvPr>
-            <p:ph type="dt" sz="half" idx="10"/>
-          </p:nvPr>
-        </p:nvSpPr>
-        <p:spPr/>
-        <p:txBody>
-          <a:bodyPr/>
-          <a:lstStyle/>
-          <a:p>
-            <a:fld id="{EA95BFF1-5948-B24D-80C9-2DF4EAC42A4D}" type="datetime2">
-              <a:rPr lang="en-US" smtClean="0"/>
-              <a:t>Wednesday, September 10, 14</a:t>
-            </a:fld>
-            <a:endParaRPr lang="en-US"/>
-          </a:p>
-        </p:txBody>
-      </p:sp>
-      <p:sp>
-        <p:nvSpPr>
           <p:cNvPr id="5" name="Footer Placeholder 4"/>
           <p:cNvSpPr>
             <a:spLocks noGrp="1"/>
@@ -10475,7 +10318,7 @@
             <a:pPr algn="r"/>
             <a:r>
               <a:rPr lang="en-US" smtClean="0"/>
-              <a:t>Sanjay Kalé and PPL (UIUC) – Parallel Migratable Objects </a:t>
+              <a:t>Laxmikant Kalé and PPL (UIUC) – Parallel Migratable Objects </a:t>
             </a:r>
             <a:endParaRPr lang="en-US" dirty="0"/>
           </a:p>
@@ -10730,29 +10573,6 @@
       </p:sp>
       <p:sp>
         <p:nvSpPr>
-          <p:cNvPr id="4" name="Date Placeholder 3"/>
-          <p:cNvSpPr>
-            <a:spLocks noGrp="1"/>
-          </p:cNvSpPr>
-          <p:nvPr>
-            <p:ph type="dt" sz="half" idx="10"/>
-          </p:nvPr>
-        </p:nvSpPr>
-        <p:spPr/>
-        <p:txBody>
-          <a:bodyPr/>
-          <a:lstStyle/>
-          <a:p>
-            <a:fld id="{34621E95-60A9-FF44-9869-513D9D7A859F}" type="datetime2">
-              <a:rPr lang="en-US" smtClean="0"/>
-              <a:t>Wednesday, September 10, 14</a:t>
-            </a:fld>
-            <a:endParaRPr lang="en-US"/>
-          </a:p>
-        </p:txBody>
-      </p:sp>
-      <p:sp>
-        <p:nvSpPr>
           <p:cNvPr id="5" name="Footer Placeholder 4"/>
           <p:cNvSpPr>
             <a:spLocks noGrp="1"/>
@@ -10769,7 +10589,7 @@
             <a:pPr algn="r"/>
             <a:r>
               <a:rPr lang="en-US" smtClean="0"/>
-              <a:t>Sanjay Kalé and PPL (UIUC) – Parallel Migratable Objects </a:t>
+              <a:t>Laxmikant Kalé and PPL (UIUC) – Parallel Migratable Objects </a:t>
             </a:r>
             <a:endParaRPr lang="en-US" dirty="0"/>
           </a:p>
@@ -11013,29 +10833,6 @@
       </p:sp>
       <p:sp>
         <p:nvSpPr>
-          <p:cNvPr id="5" name="Date Placeholder 4"/>
-          <p:cNvSpPr>
-            <a:spLocks noGrp="1"/>
-          </p:cNvSpPr>
-          <p:nvPr>
-            <p:ph type="dt" sz="half" idx="10"/>
-          </p:nvPr>
-        </p:nvSpPr>
-        <p:spPr/>
-        <p:txBody>
-          <a:bodyPr/>
-          <a:lstStyle/>
-          <a:p>
-            <a:fld id="{8463968F-93A4-C84C-9FC0-6F1C4806BE33}" type="datetime2">
-              <a:rPr lang="en-US" smtClean="0"/>
-              <a:t>Wednesday, September 10, 14</a:t>
-            </a:fld>
-            <a:endParaRPr lang="en-US"/>
-          </a:p>
-        </p:txBody>
-      </p:sp>
-      <p:sp>
-        <p:nvSpPr>
           <p:cNvPr id="6" name="Footer Placeholder 5"/>
           <p:cNvSpPr>
             <a:spLocks noGrp="1"/>
@@ -11052,7 +10849,7 @@
             <a:pPr algn="r"/>
             <a:r>
               <a:rPr lang="en-US" smtClean="0"/>
-              <a:t>Sanjay Kalé and PPL (UIUC) – Parallel Migratable Objects </a:t>
+              <a:t>Laxmikant Kalé and PPL (UIUC) – Parallel Migratable Objects </a:t>
             </a:r>
             <a:endParaRPr lang="en-US" dirty="0"/>
           </a:p>
@@ -11453,29 +11250,6 @@
       </p:sp>
       <p:sp>
         <p:nvSpPr>
-          <p:cNvPr id="5" name="Date Placeholder 4"/>
-          <p:cNvSpPr>
-            <a:spLocks noGrp="1"/>
-          </p:cNvSpPr>
-          <p:nvPr>
-            <p:ph type="dt" sz="half" idx="10"/>
-          </p:nvPr>
-        </p:nvSpPr>
-        <p:spPr/>
-        <p:txBody>
-          <a:bodyPr/>
-          <a:lstStyle/>
-          <a:p>
-            <a:fld id="{99D99C1C-6727-C344-B1D9-5F6CCC13E6A8}" type="datetime2">
-              <a:rPr lang="en-US" smtClean="0"/>
-              <a:t>Wednesday, September 10, 14</a:t>
-            </a:fld>
-            <a:endParaRPr lang="en-US"/>
-          </a:p>
-        </p:txBody>
-      </p:sp>
-      <p:sp>
-        <p:nvSpPr>
           <p:cNvPr id="6" name="Footer Placeholder 5"/>
           <p:cNvSpPr>
             <a:spLocks noGrp="1"/>
@@ -11492,7 +11266,7 @@
             <a:pPr algn="r"/>
             <a:r>
               <a:rPr lang="en-US" smtClean="0"/>
-              <a:t>Sanjay Kalé and PPL (UIUC) – Parallel Migratable Objects </a:t>
+              <a:t>Laxmikant Kalé and PPL (UIUC) – Parallel Migratable Objects </a:t>
             </a:r>
             <a:endParaRPr lang="en-US" dirty="0"/>
           </a:p>
@@ -14427,29 +14201,6 @@
       </p:sp>
       <p:sp>
         <p:nvSpPr>
-          <p:cNvPr id="2" name="Date Placeholder 1"/>
-          <p:cNvSpPr>
-            <a:spLocks noGrp="1"/>
-          </p:cNvSpPr>
-          <p:nvPr>
-            <p:ph type="dt" sz="half" idx="10"/>
-          </p:nvPr>
-        </p:nvSpPr>
-        <p:spPr/>
-        <p:txBody>
-          <a:bodyPr/>
-          <a:lstStyle/>
-          <a:p>
-            <a:fld id="{7EE0B537-EEC6-A84A-9C51-603D8E7685E9}" type="datetime2">
-              <a:rPr lang="en-US" smtClean="0"/>
-              <a:t>Wednesday, September 10, 14</a:t>
-            </a:fld>
-            <a:endParaRPr lang="en-US"/>
-          </a:p>
-        </p:txBody>
-      </p:sp>
-      <p:sp>
-        <p:nvSpPr>
           <p:cNvPr id="3" name="Footer Placeholder 2"/>
           <p:cNvSpPr>
             <a:spLocks noGrp="1"/>
@@ -14466,7 +14217,7 @@
             <a:pPr algn="r"/>
             <a:r>
               <a:rPr lang="en-US" smtClean="0"/>
-              <a:t>Sanjay Kalé and PPL (UIUC) – Parallel Migratable Objects </a:t>
+              <a:t>Laxmikant Kalé and PPL (UIUC) – Parallel Migratable Objects </a:t>
             </a:r>
             <a:endParaRPr lang="en-US" dirty="0"/>
           </a:p>
@@ -14535,29 +14286,6 @@
       </p:grpSpPr>
       <p:sp>
         <p:nvSpPr>
-          <p:cNvPr id="5" name="Date Placeholder 4"/>
-          <p:cNvSpPr>
-            <a:spLocks noGrp="1"/>
-          </p:cNvSpPr>
-          <p:nvPr>
-            <p:ph type="dt" sz="half" idx="10"/>
-          </p:nvPr>
-        </p:nvSpPr>
-        <p:spPr/>
-        <p:txBody>
-          <a:bodyPr/>
-          <a:lstStyle/>
-          <a:p>
-            <a:fld id="{99D99C1C-6727-C344-B1D9-5F6CCC13E6A8}" type="datetime2">
-              <a:rPr lang="en-US" smtClean="0"/>
-              <a:t>Wednesday, September 10, 14</a:t>
-            </a:fld>
-            <a:endParaRPr lang="en-US"/>
-          </a:p>
-        </p:txBody>
-      </p:sp>
-      <p:sp>
-        <p:nvSpPr>
           <p:cNvPr id="6" name="Footer Placeholder 5"/>
           <p:cNvSpPr>
             <a:spLocks noGrp="1"/>
@@ -14574,7 +14302,7 @@
             <a:pPr algn="r"/>
             <a:r>
               <a:rPr lang="en-US" smtClean="0"/>
-              <a:t>Sanjay Kalé and PPL (UIUC) – Parallel Migratable Objects </a:t>
+              <a:t>Laxmikant Kalé and PPL (UIUC) – Parallel Migratable Objects </a:t>
             </a:r>
             <a:endParaRPr lang="en-US" dirty="0"/>
           </a:p>
@@ -19585,29 +19313,6 @@
       </p:grpSpPr>
       <p:sp>
         <p:nvSpPr>
-          <p:cNvPr id="5" name="Date Placeholder 4"/>
-          <p:cNvSpPr>
-            <a:spLocks noGrp="1"/>
-          </p:cNvSpPr>
-          <p:nvPr>
-            <p:ph type="dt" sz="half" idx="10"/>
-          </p:nvPr>
-        </p:nvSpPr>
-        <p:spPr/>
-        <p:txBody>
-          <a:bodyPr/>
-          <a:lstStyle/>
-          <a:p>
-            <a:fld id="{99D99C1C-6727-C344-B1D9-5F6CCC13E6A8}" type="datetime2">
-              <a:rPr lang="en-US" smtClean="0"/>
-              <a:t>Wednesday, September 10, 14</a:t>
-            </a:fld>
-            <a:endParaRPr lang="en-US"/>
-          </a:p>
-        </p:txBody>
-      </p:sp>
-      <p:sp>
-        <p:nvSpPr>
           <p:cNvPr id="6" name="Footer Placeholder 5"/>
           <p:cNvSpPr>
             <a:spLocks noGrp="1"/>
@@ -19624,7 +19329,7 @@
             <a:pPr algn="r"/>
             <a:r>
               <a:rPr lang="en-US" smtClean="0"/>
-              <a:t>Sanjay Kalé and PPL (UIUC) – Parallel Migratable Objects </a:t>
+              <a:t>Laxmikant Kalé and PPL (UIUC) – Parallel Migratable Objects </a:t>
             </a:r>
             <a:endParaRPr lang="en-US" dirty="0"/>
           </a:p>
@@ -25615,29 +25320,6 @@
       </p:grpSpPr>
       <p:sp>
         <p:nvSpPr>
-          <p:cNvPr id="5" name="Date Placeholder 4"/>
-          <p:cNvSpPr>
-            <a:spLocks noGrp="1"/>
-          </p:cNvSpPr>
-          <p:nvPr>
-            <p:ph type="dt" sz="half" idx="10"/>
-          </p:nvPr>
-        </p:nvSpPr>
-        <p:spPr/>
-        <p:txBody>
-          <a:bodyPr/>
-          <a:lstStyle/>
-          <a:p>
-            <a:fld id="{99D99C1C-6727-C344-B1D9-5F6CCC13E6A8}" type="datetime2">
-              <a:rPr lang="en-US" smtClean="0"/>
-              <a:t>Wednesday, September 10, 14</a:t>
-            </a:fld>
-            <a:endParaRPr lang="en-US"/>
-          </a:p>
-        </p:txBody>
-      </p:sp>
-      <p:sp>
-        <p:nvSpPr>
           <p:cNvPr id="6" name="Footer Placeholder 5"/>
           <p:cNvSpPr>
             <a:spLocks noGrp="1"/>
@@ -25654,7 +25336,7 @@
             <a:pPr algn="r"/>
             <a:r>
               <a:rPr lang="en-US" smtClean="0"/>
-              <a:t>Sanjay Kalé and PPL (UIUC) – Parallel Migratable Objects </a:t>
+              <a:t>Laxmikant Kalé and PPL (UIUC) – Parallel Migratable Objects </a:t>
             </a:r>
             <a:endParaRPr lang="en-US" dirty="0"/>
           </a:p>
@@ -30803,7 +30485,6 @@
               <a:rPr lang="en-US" dirty="0"/>
               <a:t>Empowering the RTS</a:t>
             </a:r>
-            <a:endParaRPr lang="en-US" dirty="0"/>
           </a:p>
         </p:txBody>
       </p:sp>
@@ -30885,29 +30566,6 @@
       </p:sp>
       <p:sp>
         <p:nvSpPr>
-          <p:cNvPr id="5" name="Date Placeholder 4"/>
-          <p:cNvSpPr>
-            <a:spLocks noGrp="1"/>
-          </p:cNvSpPr>
-          <p:nvPr>
-            <p:ph type="dt" sz="half" idx="10"/>
-          </p:nvPr>
-        </p:nvSpPr>
-        <p:spPr/>
-        <p:txBody>
-          <a:bodyPr/>
-          <a:lstStyle/>
-          <a:p>
-            <a:fld id="{8463968F-93A4-C84C-9FC0-6F1C4806BE33}" type="datetime2">
-              <a:rPr lang="en-US" smtClean="0"/>
-              <a:t>Wednesday, September 10, 14</a:t>
-            </a:fld>
-            <a:endParaRPr lang="en-US"/>
-          </a:p>
-        </p:txBody>
-      </p:sp>
-      <p:sp>
-        <p:nvSpPr>
           <p:cNvPr id="6" name="Footer Placeholder 5"/>
           <p:cNvSpPr>
             <a:spLocks noGrp="1"/>
@@ -30924,7 +30582,7 @@
             <a:pPr algn="r"/>
             <a:r>
               <a:rPr lang="en-US" smtClean="0"/>
-              <a:t>Sanjay Kalé and PPL (UIUC) – Parallel Migratable Objects </a:t>
+              <a:t>Laxmikant Kalé and PPL (UIUC) – Parallel Migratable Objects </a:t>
             </a:r>
             <a:endParaRPr lang="en-US" dirty="0"/>
           </a:p>
@@ -32113,29 +31771,6 @@
       </p:sp>
       <p:sp>
         <p:nvSpPr>
-          <p:cNvPr id="4" name="Date Placeholder 3"/>
-          <p:cNvSpPr>
-            <a:spLocks noGrp="1"/>
-          </p:cNvSpPr>
-          <p:nvPr>
-            <p:ph type="dt" sz="half" idx="10"/>
-          </p:nvPr>
-        </p:nvSpPr>
-        <p:spPr/>
-        <p:txBody>
-          <a:bodyPr/>
-          <a:lstStyle/>
-          <a:p>
-            <a:fld id="{36D5A094-9275-C84D-84D4-E4C2DFD8E1DF}" type="datetime2">
-              <a:rPr lang="en-US" smtClean="0"/>
-              <a:t>Wednesday, September 10, 14</a:t>
-            </a:fld>
-            <a:endParaRPr lang="en-US"/>
-          </a:p>
-        </p:txBody>
-      </p:sp>
-      <p:sp>
-        <p:nvSpPr>
           <p:cNvPr id="5" name="Footer Placeholder 4"/>
           <p:cNvSpPr>
             <a:spLocks noGrp="1"/>
@@ -32152,7 +31787,7 @@
             <a:pPr algn="r"/>
             <a:r>
               <a:rPr lang="en-US" smtClean="0"/>
-              <a:t>Sanjay Kalé and PPL (UIUC) – Parallel Migratable Objects </a:t>
+              <a:t>Laxmikant Kalé and PPL (UIUC) – Parallel Migratable Objects </a:t>
             </a:r>
             <a:endParaRPr lang="en-US" dirty="0"/>
           </a:p>
@@ -32437,29 +32072,6 @@
       </p:sp>
       <p:sp>
         <p:nvSpPr>
-          <p:cNvPr id="4" name="Date Placeholder 3"/>
-          <p:cNvSpPr>
-            <a:spLocks noGrp="1"/>
-          </p:cNvSpPr>
-          <p:nvPr>
-            <p:ph type="dt" sz="half" idx="10"/>
-          </p:nvPr>
-        </p:nvSpPr>
-        <p:spPr/>
-        <p:txBody>
-          <a:bodyPr/>
-          <a:lstStyle/>
-          <a:p>
-            <a:fld id="{231C4983-29CA-804F-B0C2-861AD8815D43}" type="datetime2">
-              <a:rPr lang="en-US" smtClean="0"/>
-              <a:t>Wednesday, September 10, 14</a:t>
-            </a:fld>
-            <a:endParaRPr lang="en-US"/>
-          </a:p>
-        </p:txBody>
-      </p:sp>
-      <p:sp>
-        <p:nvSpPr>
           <p:cNvPr id="5" name="Footer Placeholder 4"/>
           <p:cNvSpPr>
             <a:spLocks noGrp="1"/>
@@ -32476,7 +32088,7 @@
             <a:pPr algn="r"/>
             <a:r>
               <a:rPr lang="en-US" smtClean="0"/>
-              <a:t>Sanjay Kalé and PPL (UIUC) – Parallel Migratable Objects </a:t>
+              <a:t>Laxmikant Kalé and PPL (UIUC) – Parallel Migratable Objects </a:t>
             </a:r>
             <a:endParaRPr lang="en-US" dirty="0"/>
           </a:p>
@@ -32723,29 +32335,6 @@
       </p:pic>
       <p:sp>
         <p:nvSpPr>
-          <p:cNvPr id="3" name="Date Placeholder 2"/>
-          <p:cNvSpPr>
-            <a:spLocks noGrp="1"/>
-          </p:cNvSpPr>
-          <p:nvPr>
-            <p:ph type="dt" sz="half" idx="10"/>
-          </p:nvPr>
-        </p:nvSpPr>
-        <p:spPr/>
-        <p:txBody>
-          <a:bodyPr/>
-          <a:lstStyle/>
-          <a:p>
-            <a:fld id="{49969878-E4FC-4B4F-8757-96654B5071D4}" type="datetime2">
-              <a:rPr lang="en-US" smtClean="0"/>
-              <a:t>Wednesday, September 10, 14</a:t>
-            </a:fld>
-            <a:endParaRPr lang="en-US" dirty="0"/>
-          </a:p>
-        </p:txBody>
-      </p:sp>
-      <p:sp>
-        <p:nvSpPr>
           <p:cNvPr id="5" name="Footer Placeholder 4"/>
           <p:cNvSpPr>
             <a:spLocks noGrp="1"/>
@@ -32762,7 +32351,7 @@
             <a:pPr algn="r"/>
             <a:r>
               <a:rPr lang="en-US" smtClean="0"/>
-              <a:t>Sanjay Kalé and PPL (UIUC) – Parallel Migratable Objects </a:t>
+              <a:t>Laxmikant Kalé and PPL (UIUC) – Parallel Migratable Objects </a:t>
             </a:r>
             <a:endParaRPr lang="en-US" dirty="0"/>
           </a:p>
@@ -33311,29 +32900,6 @@
       </p:sp>
       <p:sp>
         <p:nvSpPr>
-          <p:cNvPr id="4" name="Date Placeholder 3"/>
-          <p:cNvSpPr>
-            <a:spLocks noGrp="1"/>
-          </p:cNvSpPr>
-          <p:nvPr>
-            <p:ph type="dt" sz="half" idx="10"/>
-          </p:nvPr>
-        </p:nvSpPr>
-        <p:spPr/>
-        <p:txBody>
-          <a:bodyPr/>
-          <a:lstStyle/>
-          <a:p>
-            <a:fld id="{1B28481D-820C-BD47-8A20-F66B1E586D0A}" type="datetime2">
-              <a:rPr lang="en-US" smtClean="0"/>
-              <a:t>Wednesday, September 10, 14</a:t>
-            </a:fld>
-            <a:endParaRPr lang="en-US"/>
-          </a:p>
-        </p:txBody>
-      </p:sp>
-      <p:sp>
-        <p:nvSpPr>
           <p:cNvPr id="5" name="Footer Placeholder 4"/>
           <p:cNvSpPr>
             <a:spLocks noGrp="1"/>
@@ -33350,7 +32916,7 @@
             <a:pPr algn="r"/>
             <a:r>
               <a:rPr lang="en-US" smtClean="0"/>
-              <a:t>Sanjay Kalé and PPL (UIUC) – Parallel Migratable Objects </a:t>
+              <a:t>Laxmikant Kalé and PPL (UIUC) – Parallel Migratable Objects </a:t>
             </a:r>
             <a:endParaRPr lang="en-US" dirty="0"/>
           </a:p>
@@ -33665,29 +33231,6 @@
       </p:sp>
       <p:sp>
         <p:nvSpPr>
-          <p:cNvPr id="4" name="Date Placeholder 3"/>
-          <p:cNvSpPr>
-            <a:spLocks noGrp="1"/>
-          </p:cNvSpPr>
-          <p:nvPr>
-            <p:ph type="dt" sz="half" idx="10"/>
-          </p:nvPr>
-        </p:nvSpPr>
-        <p:spPr/>
-        <p:txBody>
-          <a:bodyPr/>
-          <a:lstStyle/>
-          <a:p>
-            <a:fld id="{6687E3A6-73AF-3C4A-BF08-3ECAB60FC972}" type="datetime2">
-              <a:rPr lang="en-US" smtClean="0"/>
-              <a:t>Wednesday, September 10, 14</a:t>
-            </a:fld>
-            <a:endParaRPr lang="en-US"/>
-          </a:p>
-        </p:txBody>
-      </p:sp>
-      <p:sp>
-        <p:nvSpPr>
           <p:cNvPr id="5" name="Footer Placeholder 4"/>
           <p:cNvSpPr>
             <a:spLocks noGrp="1"/>
@@ -33704,7 +33247,7 @@
             <a:pPr algn="r"/>
             <a:r>
               <a:rPr lang="en-US" smtClean="0"/>
-              <a:t>Sanjay Kalé and PPL (UIUC) – Parallel Migratable Objects </a:t>
+              <a:t>Laxmikant Kalé and PPL (UIUC) – Parallel Migratable Objects </a:t>
             </a:r>
             <a:endParaRPr lang="en-US" dirty="0"/>
           </a:p>
@@ -33790,15 +33333,7 @@
           <a:p>
             <a:r>
               <a:rPr lang="en-US" sz="3200" dirty="0" smtClean="0"/>
-              <a:t>Programming </a:t>
-            </a:r>
-            <a:r>
-              <a:rPr lang="en-US" sz="3200" dirty="0" smtClean="0"/>
-              <a:t>Models: </a:t>
-            </a:r>
-            <a:r>
-              <a:rPr lang="en-US" sz="3200" dirty="0" smtClean="0"/>
-              <a:t>What is Charm++?</a:t>
+              <a:t>Programming Models: What is Charm++?</a:t>
             </a:r>
             <a:endParaRPr lang="en-US" sz="3200" dirty="0"/>
           </a:p>
@@ -33917,29 +33452,6 @@
       </p:sp>
       <p:sp>
         <p:nvSpPr>
-          <p:cNvPr id="4" name="Date Placeholder 3"/>
-          <p:cNvSpPr>
-            <a:spLocks noGrp="1"/>
-          </p:cNvSpPr>
-          <p:nvPr>
-            <p:ph type="dt" sz="half" idx="10"/>
-          </p:nvPr>
-        </p:nvSpPr>
-        <p:spPr/>
-        <p:txBody>
-          <a:bodyPr/>
-          <a:lstStyle/>
-          <a:p>
-            <a:fld id="{6687E3A6-73AF-3C4A-BF08-3ECAB60FC972}" type="datetime2">
-              <a:rPr lang="en-US" smtClean="0"/>
-              <a:t>Wednesday, September 10, 14</a:t>
-            </a:fld>
-            <a:endParaRPr lang="en-US"/>
-          </a:p>
-        </p:txBody>
-      </p:sp>
-      <p:sp>
-        <p:nvSpPr>
           <p:cNvPr id="5" name="Footer Placeholder 4"/>
           <p:cNvSpPr>
             <a:spLocks noGrp="1"/>
@@ -33956,7 +33468,7 @@
             <a:pPr algn="r"/>
             <a:r>
               <a:rPr lang="en-US" smtClean="0"/>
-              <a:t>Sanjay Kalé and PPL (UIUC) – Parallel Migratable Objects </a:t>
+              <a:t>Laxmikant Kalé and PPL (UIUC) – Parallel Migratable Objects </a:t>
             </a:r>
             <a:endParaRPr lang="en-US" dirty="0"/>
           </a:p>
@@ -34515,29 +34027,6 @@
       </p:sp>
       <p:sp>
         <p:nvSpPr>
-          <p:cNvPr id="6" name="Date Placeholder 5"/>
-          <p:cNvSpPr>
-            <a:spLocks noGrp="1"/>
-          </p:cNvSpPr>
-          <p:nvPr>
-            <p:ph type="dt" sz="half" idx="10"/>
-          </p:nvPr>
-        </p:nvSpPr>
-        <p:spPr/>
-        <p:txBody>
-          <a:bodyPr/>
-          <a:lstStyle/>
-          <a:p>
-            <a:fld id="{E2BEDE58-EB0D-8D49-81F3-C834FB63B2FF}" type="datetime2">
-              <a:rPr lang="en-US" smtClean="0"/>
-              <a:t>Wednesday, September 10, 14</a:t>
-            </a:fld>
-            <a:endParaRPr lang="en-US" dirty="0"/>
-          </a:p>
-        </p:txBody>
-      </p:sp>
-      <p:sp>
-        <p:nvSpPr>
           <p:cNvPr id="7" name="Footer Placeholder 6"/>
           <p:cNvSpPr>
             <a:spLocks noGrp="1"/>
@@ -34554,7 +34043,7 @@
             <a:pPr algn="r"/>
             <a:r>
               <a:rPr lang="en-US" smtClean="0"/>
-              <a:t>Sanjay Kalé and PPL (UIUC) – Parallel Migratable Objects </a:t>
+              <a:t>Laxmikant Kalé and PPL (UIUC) – Parallel Migratable Objects </a:t>
             </a:r>
             <a:endParaRPr lang="en-US" dirty="0"/>
           </a:p>

</xml_diff>

<commit_message>
center text boxes, quotes, code cleanup, add celso initial, various other changes in both versions to match
</commit_message>
<xml_diff>
--- a/tutorial-01-intro.pptx
+++ b/tutorial-01-intro.pptx
@@ -6633,11 +6633,7 @@
           <a:p>
             <a:r>
               <a:rPr lang="en-US" dirty="0" smtClean="0"/>
-              <a:t>Laxmikant Kalé </a:t>
-            </a:r>
-            <a:r>
-              <a:rPr lang="en-US" dirty="0" smtClean="0"/>
-              <a:t>and PPL (UIUC) – Parallel Migratable Objects </a:t>
+              <a:t>Laxmikant Kalé and PPL (UIUC) – Parallel Migratable Objects </a:t>
             </a:r>
             <a:endParaRPr lang="en-US" dirty="0"/>
           </a:p>
@@ -30645,6 +30641,7 @@
           <a:bodyPr rtlCol="0" anchor="ctr"/>
           <a:lstStyle/>
           <a:p>
+            <a:pPr algn="ctr"/>
             <a:r>
               <a:rPr lang="en-US" dirty="0"/>
               <a:t>Asynchrony</a:t>
@@ -30727,6 +30724,7 @@
           <a:bodyPr rtlCol="0" anchor="ctr"/>
           <a:lstStyle/>
           <a:p>
+            <a:pPr algn="ctr"/>
             <a:r>
               <a:rPr lang="en-US" dirty="0" err="1" smtClean="0"/>
               <a:t>Migratability</a:t>
@@ -30863,6 +30861,7 @@
           <a:bodyPr rtlCol="0" anchor="ctr"/>
           <a:lstStyle/>
           <a:p>
+            <a:pPr algn="ctr"/>
             <a:r>
               <a:rPr lang="en-US" sz="2000" dirty="0" smtClean="0"/>
               <a:t>Introspection</a:t>
@@ -30931,6 +30930,7 @@
           <a:bodyPr rtlCol="0" anchor="ctr"/>
           <a:lstStyle/>
           <a:p>
+            <a:pPr algn="ctr"/>
             <a:r>
               <a:rPr lang="en-US" sz="2000" dirty="0" err="1" smtClean="0"/>
               <a:t>Adaptivity</a:t>

</xml_diff>